<commit_message>
Updated presentation with extra link
</commit_message>
<xml_diff>
--- a/Presentation.pptx
+++ b/Presentation.pptx
@@ -127,6 +127,11 @@
       </a:defRPr>
     </a:lvl9pPr>
   </p:defaultTextStyle>
+  <p:extLst>
+    <p:ext uri="{EFAFB233-063F-42B5-8137-9DF3F51BA10A}">
+      <p15:sldGuideLst xmlns:p15="http://schemas.microsoft.com/office/powerpoint/2012/main"/>
+    </p:ext>
+  </p:extLst>
 </p:presentation>
 </file>
 
@@ -2707,6 +2712,13 @@
     <dgm:pt modelId="{5A2FB032-CC70-4B51-A7B3-CB0733FA716E}" type="pres">
       <dgm:prSet presAssocID="{3153A1D2-16A8-4DBB-84F3-28E87B81E6E6}" presName="wedge1" presStyleLbl="node1" presStyleIdx="0" presStyleCnt="4"/>
       <dgm:spPr/>
+      <dgm:t>
+        <a:bodyPr/>
+        <a:lstStyle/>
+        <a:p>
+          <a:endParaRPr lang="en-US"/>
+        </a:p>
+      </dgm:t>
     </dgm:pt>
     <dgm:pt modelId="{E7A23E98-94EA-422D-B37F-9A30D81C6B94}" type="pres">
       <dgm:prSet presAssocID="{3153A1D2-16A8-4DBB-84F3-28E87B81E6E6}" presName="dummy1a" presStyleCnt="0"/>
@@ -2725,6 +2737,13 @@
         </dgm:presLayoutVars>
       </dgm:prSet>
       <dgm:spPr/>
+      <dgm:t>
+        <a:bodyPr/>
+        <a:lstStyle/>
+        <a:p>
+          <a:endParaRPr lang="en-US"/>
+        </a:p>
+      </dgm:t>
     </dgm:pt>
     <dgm:pt modelId="{87EF04A0-496E-4674-BFA0-D541BE54BA23}" type="pres">
       <dgm:prSet presAssocID="{3153A1D2-16A8-4DBB-84F3-28E87B81E6E6}" presName="wedge2" presStyleLbl="node1" presStyleIdx="1" presStyleCnt="4"/>
@@ -2765,6 +2784,13 @@
     <dgm:pt modelId="{075A10BF-F58B-4399-B76F-5FBBFA542012}" type="pres">
       <dgm:prSet presAssocID="{3153A1D2-16A8-4DBB-84F3-28E87B81E6E6}" presName="wedge3" presStyleLbl="node1" presStyleIdx="2" presStyleCnt="4"/>
       <dgm:spPr/>
+      <dgm:t>
+        <a:bodyPr/>
+        <a:lstStyle/>
+        <a:p>
+          <a:endParaRPr lang="en-US"/>
+        </a:p>
+      </dgm:t>
     </dgm:pt>
     <dgm:pt modelId="{5732E04C-4A43-43E0-9CD2-17A6CC12608B}" type="pres">
       <dgm:prSet presAssocID="{3153A1D2-16A8-4DBB-84F3-28E87B81E6E6}" presName="dummy3a" presStyleCnt="0"/>
@@ -2783,10 +2809,24 @@
         </dgm:presLayoutVars>
       </dgm:prSet>
       <dgm:spPr/>
+      <dgm:t>
+        <a:bodyPr/>
+        <a:lstStyle/>
+        <a:p>
+          <a:endParaRPr lang="en-US"/>
+        </a:p>
+      </dgm:t>
     </dgm:pt>
     <dgm:pt modelId="{22B377EF-E448-456D-9679-6E3F43C2FBCA}" type="pres">
       <dgm:prSet presAssocID="{3153A1D2-16A8-4DBB-84F3-28E87B81E6E6}" presName="wedge4" presStyleLbl="node1" presStyleIdx="3" presStyleCnt="4"/>
       <dgm:spPr/>
+      <dgm:t>
+        <a:bodyPr/>
+        <a:lstStyle/>
+        <a:p>
+          <a:endParaRPr lang="en-US"/>
+        </a:p>
+      </dgm:t>
     </dgm:pt>
     <dgm:pt modelId="{B2F85638-C829-4E31-8A72-B23EE974EA8A}" type="pres">
       <dgm:prSet presAssocID="{3153A1D2-16A8-4DBB-84F3-28E87B81E6E6}" presName="dummy4a" presStyleCnt="0"/>
@@ -2805,6 +2845,13 @@
         </dgm:presLayoutVars>
       </dgm:prSet>
       <dgm:spPr/>
+      <dgm:t>
+        <a:bodyPr/>
+        <a:lstStyle/>
+        <a:p>
+          <a:endParaRPr lang="en-US"/>
+        </a:p>
+      </dgm:t>
     </dgm:pt>
     <dgm:pt modelId="{2B40289F-58CE-4AFF-B3B1-90EA6F0AD4AA}" type="pres">
       <dgm:prSet presAssocID="{723E3D26-5D80-4AB3-B686-A165536B0E88}" presName="arrowWedge1" presStyleLbl="fgSibTrans2D1" presStyleIdx="0" presStyleCnt="4"/>
@@ -2831,19 +2878,19 @@
     </dgm:pt>
   </dgm:ptLst>
   <dgm:cxnLst>
+    <dgm:cxn modelId="{EAE676CE-A6E1-4ECD-9CD9-445742654447}" srcId="{3153A1D2-16A8-4DBB-84F3-28E87B81E6E6}" destId="{EF22A87B-3F8A-47BE-94AD-9111FBA0213D}" srcOrd="1" destOrd="0" parTransId="{A6EC063B-82C5-4CA3-8280-1F0126B0283D}" sibTransId="{C520A8D9-A4B5-42E8-BA41-EB8F156F8639}"/>
+    <dgm:cxn modelId="{177A6C31-0FC5-490C-9C0E-60590FDDEF08}" srcId="{3153A1D2-16A8-4DBB-84F3-28E87B81E6E6}" destId="{0008B0B5-378A-461B-BACD-F0CCCDAAAB96}" srcOrd="2" destOrd="0" parTransId="{066E1EBD-FC90-4A76-96FB-E6B1BF8651AD}" sibTransId="{8A9DE253-C0D2-4BEB-84E6-7DFD06B198A5}"/>
+    <dgm:cxn modelId="{C38E4EAA-7F46-4776-9190-5826D59FAB67}" type="presOf" srcId="{D93DB10C-44F1-4312-B4F0-17A80932230D}" destId="{FA1BAB0B-49FE-4E7F-BED7-DD77ED486817}" srcOrd="1" destOrd="0" presId="urn:microsoft.com/office/officeart/2005/8/layout/cycle8"/>
+    <dgm:cxn modelId="{391699D5-FBEC-4E39-9813-96ECB562F680}" srcId="{3153A1D2-16A8-4DBB-84F3-28E87B81E6E6}" destId="{D93DB10C-44F1-4312-B4F0-17A80932230D}" srcOrd="0" destOrd="0" parTransId="{378CFC7A-86AB-4F36-9CE6-01A6EBA96BD4}" sibTransId="{723E3D26-5D80-4AB3-B686-A165536B0E88}"/>
+    <dgm:cxn modelId="{A45683DA-3BDB-4370-8944-D754DFC587AB}" type="presOf" srcId="{EF22A87B-3F8A-47BE-94AD-9111FBA0213D}" destId="{87EF04A0-496E-4674-BFA0-D541BE54BA23}" srcOrd="0" destOrd="0" presId="urn:microsoft.com/office/officeart/2005/8/layout/cycle8"/>
+    <dgm:cxn modelId="{9A44E367-6517-4E36-94BA-5F2E8F7A0ACB}" type="presOf" srcId="{6548054A-FDD4-4357-B790-7D006062E663}" destId="{6802B5AB-DB27-42AC-AE1E-257634E02559}" srcOrd="1" destOrd="0" presId="urn:microsoft.com/office/officeart/2005/8/layout/cycle8"/>
     <dgm:cxn modelId="{3677FE39-596F-45B1-B77C-6A67DFFB529D}" type="presOf" srcId="{0008B0B5-378A-461B-BACD-F0CCCDAAAB96}" destId="{075A10BF-F58B-4399-B76F-5FBBFA542012}" srcOrd="0" destOrd="0" presId="urn:microsoft.com/office/officeart/2005/8/layout/cycle8"/>
+    <dgm:cxn modelId="{EA53EE93-C061-418B-8E88-E92317782E8A}" type="presOf" srcId="{6548054A-FDD4-4357-B790-7D006062E663}" destId="{22B377EF-E448-456D-9679-6E3F43C2FBCA}" srcOrd="0" destOrd="0" presId="urn:microsoft.com/office/officeart/2005/8/layout/cycle8"/>
+    <dgm:cxn modelId="{FE2A7670-ABDF-4A51-AC59-6481EC609E67}" type="presOf" srcId="{0008B0B5-378A-461B-BACD-F0CCCDAAAB96}" destId="{7D3AEFBB-B8D5-4C28-A33C-9F20270AA858}" srcOrd="1" destOrd="0" presId="urn:microsoft.com/office/officeart/2005/8/layout/cycle8"/>
     <dgm:cxn modelId="{3F1D1A5B-34D8-4DC9-9200-5487B42E3024}" type="presOf" srcId="{EF22A87B-3F8A-47BE-94AD-9111FBA0213D}" destId="{FC0A315E-FAAF-4FA6-8B74-CD8D52EDCF6E}" srcOrd="1" destOrd="0" presId="urn:microsoft.com/office/officeart/2005/8/layout/cycle8"/>
+    <dgm:cxn modelId="{949FE8BF-C8C8-42B1-A8A5-2BA6780AC341}" srcId="{3153A1D2-16A8-4DBB-84F3-28E87B81E6E6}" destId="{6548054A-FDD4-4357-B790-7D006062E663}" srcOrd="3" destOrd="0" parTransId="{37F3717C-7CB6-43F3-B9E9-C958ABEC5B09}" sibTransId="{D874E9AB-D627-4A64-B18F-C42A600B7865}"/>
+    <dgm:cxn modelId="{DB859A69-7170-4171-A50D-C74BC3BAD87F}" type="presOf" srcId="{3153A1D2-16A8-4DBB-84F3-28E87B81E6E6}" destId="{2278CBBC-5F9A-4335-8540-DD93F46C657A}" srcOrd="0" destOrd="0" presId="urn:microsoft.com/office/officeart/2005/8/layout/cycle8"/>
     <dgm:cxn modelId="{E4F48173-3831-478E-B250-79593F3A1320}" type="presOf" srcId="{D93DB10C-44F1-4312-B4F0-17A80932230D}" destId="{5A2FB032-CC70-4B51-A7B3-CB0733FA716E}" srcOrd="0" destOrd="0" presId="urn:microsoft.com/office/officeart/2005/8/layout/cycle8"/>
-    <dgm:cxn modelId="{9A44E367-6517-4E36-94BA-5F2E8F7A0ACB}" type="presOf" srcId="{6548054A-FDD4-4357-B790-7D006062E663}" destId="{6802B5AB-DB27-42AC-AE1E-257634E02559}" srcOrd="1" destOrd="0" presId="urn:microsoft.com/office/officeart/2005/8/layout/cycle8"/>
-    <dgm:cxn modelId="{949FE8BF-C8C8-42B1-A8A5-2BA6780AC341}" srcId="{3153A1D2-16A8-4DBB-84F3-28E87B81E6E6}" destId="{6548054A-FDD4-4357-B790-7D006062E663}" srcOrd="3" destOrd="0" parTransId="{37F3717C-7CB6-43F3-B9E9-C958ABEC5B09}" sibTransId="{D874E9AB-D627-4A64-B18F-C42A600B7865}"/>
-    <dgm:cxn modelId="{A45683DA-3BDB-4370-8944-D754DFC587AB}" type="presOf" srcId="{EF22A87B-3F8A-47BE-94AD-9111FBA0213D}" destId="{87EF04A0-496E-4674-BFA0-D541BE54BA23}" srcOrd="0" destOrd="0" presId="urn:microsoft.com/office/officeart/2005/8/layout/cycle8"/>
-    <dgm:cxn modelId="{FE2A7670-ABDF-4A51-AC59-6481EC609E67}" type="presOf" srcId="{0008B0B5-378A-461B-BACD-F0CCCDAAAB96}" destId="{7D3AEFBB-B8D5-4C28-A33C-9F20270AA858}" srcOrd="1" destOrd="0" presId="urn:microsoft.com/office/officeart/2005/8/layout/cycle8"/>
-    <dgm:cxn modelId="{EA53EE93-C061-418B-8E88-E92317782E8A}" type="presOf" srcId="{6548054A-FDD4-4357-B790-7D006062E663}" destId="{22B377EF-E448-456D-9679-6E3F43C2FBCA}" srcOrd="0" destOrd="0" presId="urn:microsoft.com/office/officeart/2005/8/layout/cycle8"/>
-    <dgm:cxn modelId="{391699D5-FBEC-4E39-9813-96ECB562F680}" srcId="{3153A1D2-16A8-4DBB-84F3-28E87B81E6E6}" destId="{D93DB10C-44F1-4312-B4F0-17A80932230D}" srcOrd="0" destOrd="0" parTransId="{378CFC7A-86AB-4F36-9CE6-01A6EBA96BD4}" sibTransId="{723E3D26-5D80-4AB3-B686-A165536B0E88}"/>
-    <dgm:cxn modelId="{177A6C31-0FC5-490C-9C0E-60590FDDEF08}" srcId="{3153A1D2-16A8-4DBB-84F3-28E87B81E6E6}" destId="{0008B0B5-378A-461B-BACD-F0CCCDAAAB96}" srcOrd="2" destOrd="0" parTransId="{066E1EBD-FC90-4A76-96FB-E6B1BF8651AD}" sibTransId="{8A9DE253-C0D2-4BEB-84E6-7DFD06B198A5}"/>
-    <dgm:cxn modelId="{EAE676CE-A6E1-4ECD-9CD9-445742654447}" srcId="{3153A1D2-16A8-4DBB-84F3-28E87B81E6E6}" destId="{EF22A87B-3F8A-47BE-94AD-9111FBA0213D}" srcOrd="1" destOrd="0" parTransId="{A6EC063B-82C5-4CA3-8280-1F0126B0283D}" sibTransId="{C520A8D9-A4B5-42E8-BA41-EB8F156F8639}"/>
-    <dgm:cxn modelId="{DB859A69-7170-4171-A50D-C74BC3BAD87F}" type="presOf" srcId="{3153A1D2-16A8-4DBB-84F3-28E87B81E6E6}" destId="{2278CBBC-5F9A-4335-8540-DD93F46C657A}" srcOrd="0" destOrd="0" presId="urn:microsoft.com/office/officeart/2005/8/layout/cycle8"/>
-    <dgm:cxn modelId="{C38E4EAA-7F46-4776-9190-5826D59FAB67}" type="presOf" srcId="{D93DB10C-44F1-4312-B4F0-17A80932230D}" destId="{FA1BAB0B-49FE-4E7F-BED7-DD77ED486817}" srcOrd="1" destOrd="0" presId="urn:microsoft.com/office/officeart/2005/8/layout/cycle8"/>
     <dgm:cxn modelId="{CB276A2A-2576-452F-9F5A-57BB580C1B00}" type="presParOf" srcId="{2278CBBC-5F9A-4335-8540-DD93F46C657A}" destId="{5A2FB032-CC70-4B51-A7B3-CB0733FA716E}" srcOrd="0" destOrd="0" presId="urn:microsoft.com/office/officeart/2005/8/layout/cycle8"/>
     <dgm:cxn modelId="{8562E020-E9A6-4069-A8B3-2D562963F548}" type="presParOf" srcId="{2278CBBC-5F9A-4335-8540-DD93F46C657A}" destId="{E7A23E98-94EA-422D-B37F-9A30D81C6B94}" srcOrd="1" destOrd="0" presId="urn:microsoft.com/office/officeart/2005/8/layout/cycle8"/>
     <dgm:cxn modelId="{49A7948B-8118-4423-8AEF-3F673ECFDBA1}" type="presParOf" srcId="{2278CBBC-5F9A-4335-8540-DD93F46C657A}" destId="{61E36056-C521-41B6-966E-2EEAE3C355C4}" srcOrd="2" destOrd="0" presId="urn:microsoft.com/office/officeart/2005/8/layout/cycle8"/>
@@ -3103,6 +3150,13 @@
     <dgm:pt modelId="{075A10BF-F58B-4399-B76F-5FBBFA542012}" type="pres">
       <dgm:prSet presAssocID="{3153A1D2-16A8-4DBB-84F3-28E87B81E6E6}" presName="wedge3" presStyleLbl="node1" presStyleIdx="2" presStyleCnt="4"/>
       <dgm:spPr/>
+      <dgm:t>
+        <a:bodyPr/>
+        <a:lstStyle/>
+        <a:p>
+          <a:endParaRPr lang="en-US"/>
+        </a:p>
+      </dgm:t>
     </dgm:pt>
     <dgm:pt modelId="{5732E04C-4A43-43E0-9CD2-17A6CC12608B}" type="pres">
       <dgm:prSet presAssocID="{3153A1D2-16A8-4DBB-84F3-28E87B81E6E6}" presName="dummy3a" presStyleCnt="0"/>
@@ -3121,10 +3175,24 @@
         </dgm:presLayoutVars>
       </dgm:prSet>
       <dgm:spPr/>
+      <dgm:t>
+        <a:bodyPr/>
+        <a:lstStyle/>
+        <a:p>
+          <a:endParaRPr lang="en-US"/>
+        </a:p>
+      </dgm:t>
     </dgm:pt>
     <dgm:pt modelId="{22B377EF-E448-456D-9679-6E3F43C2FBCA}" type="pres">
       <dgm:prSet presAssocID="{3153A1D2-16A8-4DBB-84F3-28E87B81E6E6}" presName="wedge4" presStyleLbl="node1" presStyleIdx="3" presStyleCnt="4"/>
       <dgm:spPr/>
+      <dgm:t>
+        <a:bodyPr/>
+        <a:lstStyle/>
+        <a:p>
+          <a:endParaRPr lang="en-US"/>
+        </a:p>
+      </dgm:t>
     </dgm:pt>
     <dgm:pt modelId="{B2F85638-C829-4E31-8A72-B23EE974EA8A}" type="pres">
       <dgm:prSet presAssocID="{3153A1D2-16A8-4DBB-84F3-28E87B81E6E6}" presName="dummy4a" presStyleCnt="0"/>
@@ -3143,6 +3211,13 @@
         </dgm:presLayoutVars>
       </dgm:prSet>
       <dgm:spPr/>
+      <dgm:t>
+        <a:bodyPr/>
+        <a:lstStyle/>
+        <a:p>
+          <a:endParaRPr lang="en-US"/>
+        </a:p>
+      </dgm:t>
     </dgm:pt>
     <dgm:pt modelId="{3B8823FF-7D26-41A5-8E9A-269A3D4A70E0}" type="pres">
       <dgm:prSet presAssocID="{CEEA2631-46BC-47B5-B572-1E3A0A9D83E4}" presName="arrowWedge1" presStyleLbl="fgSibTrans2D1" presStyleIdx="0" presStyleCnt="4"/>
@@ -3162,18 +3237,18 @@
     </dgm:pt>
   </dgm:ptLst>
   <dgm:cxnLst>
+    <dgm:cxn modelId="{0CA7A716-8AB0-4D8E-9F48-2827FFA3E531}" type="presOf" srcId="{6548054A-FDD4-4357-B790-7D006062E663}" destId="{22B377EF-E448-456D-9679-6E3F43C2FBCA}" srcOrd="0" destOrd="0" presId="urn:microsoft.com/office/officeart/2005/8/layout/cycle8"/>
+    <dgm:cxn modelId="{96CB2578-CE40-4706-93C4-B46817FC9AB6}" type="presOf" srcId="{EF22A87B-3F8A-47BE-94AD-9111FBA0213D}" destId="{FC0A315E-FAAF-4FA6-8B74-CD8D52EDCF6E}" srcOrd="1" destOrd="0" presId="urn:microsoft.com/office/officeart/2005/8/layout/cycle8"/>
+    <dgm:cxn modelId="{EAE676CE-A6E1-4ECD-9CD9-445742654447}" srcId="{3153A1D2-16A8-4DBB-84F3-28E87B81E6E6}" destId="{EF22A87B-3F8A-47BE-94AD-9111FBA0213D}" srcOrd="1" destOrd="0" parTransId="{A6EC063B-82C5-4CA3-8280-1F0126B0283D}" sibTransId="{C520A8D9-A4B5-42E8-BA41-EB8F156F8639}"/>
     <dgm:cxn modelId="{5AA2052E-9170-4F96-AC55-6E8DC7B32D13}" type="presOf" srcId="{0008B0B5-378A-461B-BACD-F0CCCDAAAB96}" destId="{7D3AEFBB-B8D5-4C28-A33C-9F20270AA858}" srcOrd="1" destOrd="0" presId="urn:microsoft.com/office/officeart/2005/8/layout/cycle8"/>
     <dgm:cxn modelId="{177A6C31-0FC5-490C-9C0E-60590FDDEF08}" srcId="{3153A1D2-16A8-4DBB-84F3-28E87B81E6E6}" destId="{0008B0B5-378A-461B-BACD-F0CCCDAAAB96}" srcOrd="2" destOrd="0" parTransId="{066E1EBD-FC90-4A76-96FB-E6B1BF8651AD}" sibTransId="{8A9DE253-C0D2-4BEB-84E6-7DFD06B198A5}"/>
+    <dgm:cxn modelId="{8FB23AD9-4D1F-4C3E-8F75-2AC87F0BEBBE}" type="presOf" srcId="{3153A1D2-16A8-4DBB-84F3-28E87B81E6E6}" destId="{2278CBBC-5F9A-4335-8540-DD93F46C657A}" srcOrd="0" destOrd="0" presId="urn:microsoft.com/office/officeart/2005/8/layout/cycle8"/>
     <dgm:cxn modelId="{3901F438-180A-4AC9-9E05-A54C82039EBA}" type="presOf" srcId="{0008B0B5-378A-461B-BACD-F0CCCDAAAB96}" destId="{075A10BF-F58B-4399-B76F-5FBBFA542012}" srcOrd="0" destOrd="0" presId="urn:microsoft.com/office/officeart/2005/8/layout/cycle8"/>
+    <dgm:cxn modelId="{5A1A8831-3F1E-42CE-B49E-11DE742FFD66}" type="presOf" srcId="{4AEC9B94-5F27-4E35-9321-4763F9E7E5EA}" destId="{FA1BAB0B-49FE-4E7F-BED7-DD77ED486817}" srcOrd="1" destOrd="0" presId="urn:microsoft.com/office/officeart/2005/8/layout/cycle8"/>
     <dgm:cxn modelId="{4117B904-6196-4B00-BC13-B1829DDBB220}" type="presOf" srcId="{6548054A-FDD4-4357-B790-7D006062E663}" destId="{6802B5AB-DB27-42AC-AE1E-257634E02559}" srcOrd="1" destOrd="0" presId="urn:microsoft.com/office/officeart/2005/8/layout/cycle8"/>
-    <dgm:cxn modelId="{96CB2578-CE40-4706-93C4-B46817FC9AB6}" type="presOf" srcId="{EF22A87B-3F8A-47BE-94AD-9111FBA0213D}" destId="{FC0A315E-FAAF-4FA6-8B74-CD8D52EDCF6E}" srcOrd="1" destOrd="0" presId="urn:microsoft.com/office/officeart/2005/8/layout/cycle8"/>
-    <dgm:cxn modelId="{EAE676CE-A6E1-4ECD-9CD9-445742654447}" srcId="{3153A1D2-16A8-4DBB-84F3-28E87B81E6E6}" destId="{EF22A87B-3F8A-47BE-94AD-9111FBA0213D}" srcOrd="1" destOrd="0" parTransId="{A6EC063B-82C5-4CA3-8280-1F0126B0283D}" sibTransId="{C520A8D9-A4B5-42E8-BA41-EB8F156F8639}"/>
-    <dgm:cxn modelId="{0CA7A716-8AB0-4D8E-9F48-2827FFA3E531}" type="presOf" srcId="{6548054A-FDD4-4357-B790-7D006062E663}" destId="{22B377EF-E448-456D-9679-6E3F43C2FBCA}" srcOrd="0" destOrd="0" presId="urn:microsoft.com/office/officeart/2005/8/layout/cycle8"/>
     <dgm:cxn modelId="{879796C8-4C5D-4A7A-A645-F05048243700}" type="presOf" srcId="{EF22A87B-3F8A-47BE-94AD-9111FBA0213D}" destId="{87EF04A0-496E-4674-BFA0-D541BE54BA23}" srcOrd="0" destOrd="0" presId="urn:microsoft.com/office/officeart/2005/8/layout/cycle8"/>
     <dgm:cxn modelId="{8DA1D758-C30C-43AA-BDAB-8099DDCD434C}" type="presOf" srcId="{4AEC9B94-5F27-4E35-9321-4763F9E7E5EA}" destId="{5A2FB032-CC70-4B51-A7B3-CB0733FA716E}" srcOrd="0" destOrd="0" presId="urn:microsoft.com/office/officeart/2005/8/layout/cycle8"/>
-    <dgm:cxn modelId="{8FB23AD9-4D1F-4C3E-8F75-2AC87F0BEBBE}" type="presOf" srcId="{3153A1D2-16A8-4DBB-84F3-28E87B81E6E6}" destId="{2278CBBC-5F9A-4335-8540-DD93F46C657A}" srcOrd="0" destOrd="0" presId="urn:microsoft.com/office/officeart/2005/8/layout/cycle8"/>
     <dgm:cxn modelId="{23CEC309-563D-4A68-8333-38BBBF0E5936}" srcId="{3153A1D2-16A8-4DBB-84F3-28E87B81E6E6}" destId="{4AEC9B94-5F27-4E35-9321-4763F9E7E5EA}" srcOrd="0" destOrd="0" parTransId="{B0D722C3-565D-4AE7-AC16-4CE120D344D0}" sibTransId="{CEEA2631-46BC-47B5-B572-1E3A0A9D83E4}"/>
-    <dgm:cxn modelId="{5A1A8831-3F1E-42CE-B49E-11DE742FFD66}" type="presOf" srcId="{4AEC9B94-5F27-4E35-9321-4763F9E7E5EA}" destId="{FA1BAB0B-49FE-4E7F-BED7-DD77ED486817}" srcOrd="1" destOrd="0" presId="urn:microsoft.com/office/officeart/2005/8/layout/cycle8"/>
     <dgm:cxn modelId="{949FE8BF-C8C8-42B1-A8A5-2BA6780AC341}" srcId="{3153A1D2-16A8-4DBB-84F3-28E87B81E6E6}" destId="{6548054A-FDD4-4357-B790-7D006062E663}" srcOrd="3" destOrd="0" parTransId="{37F3717C-7CB6-43F3-B9E9-C958ABEC5B09}" sibTransId="{D874E9AB-D627-4A64-B18F-C42A600B7865}"/>
     <dgm:cxn modelId="{B1298158-F616-453F-BE50-8F3F2FA1BF69}" type="presParOf" srcId="{2278CBBC-5F9A-4335-8540-DD93F46C657A}" destId="{5A2FB032-CC70-4B51-A7B3-CB0733FA716E}" srcOrd="0" destOrd="0" presId="urn:microsoft.com/office/officeart/2005/8/layout/cycle8"/>
     <dgm:cxn modelId="{670EACF1-20EB-49A6-A31C-C5FF7D2BB1F4}" type="presParOf" srcId="{2278CBBC-5F9A-4335-8540-DD93F46C657A}" destId="{E7A23E98-94EA-422D-B37F-9A30D81C6B94}" srcOrd="1" destOrd="0" presId="urn:microsoft.com/office/officeart/2005/8/layout/cycle8"/>
@@ -3470,6 +3545,13 @@
     <dgm:pt modelId="{22B377EF-E448-456D-9679-6E3F43C2FBCA}" type="pres">
       <dgm:prSet presAssocID="{3153A1D2-16A8-4DBB-84F3-28E87B81E6E6}" presName="wedge4" presStyleLbl="node1" presStyleIdx="3" presStyleCnt="4"/>
       <dgm:spPr/>
+      <dgm:t>
+        <a:bodyPr/>
+        <a:lstStyle/>
+        <a:p>
+          <a:endParaRPr lang="en-US"/>
+        </a:p>
+      </dgm:t>
     </dgm:pt>
     <dgm:pt modelId="{B2F85638-C829-4E31-8A72-B23EE974EA8A}" type="pres">
       <dgm:prSet presAssocID="{3153A1D2-16A8-4DBB-84F3-28E87B81E6E6}" presName="dummy4a" presStyleCnt="0"/>
@@ -3488,6 +3570,13 @@
         </dgm:presLayoutVars>
       </dgm:prSet>
       <dgm:spPr/>
+      <dgm:t>
+        <a:bodyPr/>
+        <a:lstStyle/>
+        <a:p>
+          <a:endParaRPr lang="en-US"/>
+        </a:p>
+      </dgm:t>
     </dgm:pt>
     <dgm:pt modelId="{3B8823FF-7D26-41A5-8E9A-269A3D4A70E0}" type="pres">
       <dgm:prSet presAssocID="{CEEA2631-46BC-47B5-B572-1E3A0A9D83E4}" presName="arrowWedge1" presStyleLbl="fgSibTrans2D1" presStyleIdx="0" presStyleCnt="4"/>
@@ -3507,19 +3596,19 @@
     </dgm:pt>
   </dgm:ptLst>
   <dgm:cxnLst>
+    <dgm:cxn modelId="{97EE3899-3984-41E6-8A02-EAD9B656539A}" type="presOf" srcId="{C6A0BE9F-F376-481C-9613-A3D7644667C1}" destId="{FC0A315E-FAAF-4FA6-8B74-CD8D52EDCF6E}" srcOrd="1" destOrd="0" presId="urn:microsoft.com/office/officeart/2005/8/layout/cycle8"/>
+    <dgm:cxn modelId="{BDF7B244-A5A4-4F0B-B577-5BEEAC3D8FAC}" type="presOf" srcId="{4AEC9B94-5F27-4E35-9321-4763F9E7E5EA}" destId="{5A2FB032-CC70-4B51-A7B3-CB0733FA716E}" srcOrd="0" destOrd="0" presId="urn:microsoft.com/office/officeart/2005/8/layout/cycle8"/>
+    <dgm:cxn modelId="{F2151A12-92B4-43F8-898C-4661EE46B409}" srcId="{3153A1D2-16A8-4DBB-84F3-28E87B81E6E6}" destId="{C6A0BE9F-F376-481C-9613-A3D7644667C1}" srcOrd="1" destOrd="0" parTransId="{C4A7BF10-C84F-41B3-A55A-5D848F23350B}" sibTransId="{9F364941-B691-42C3-B831-22C535DC9890}"/>
+    <dgm:cxn modelId="{177A6C31-0FC5-490C-9C0E-60590FDDEF08}" srcId="{3153A1D2-16A8-4DBB-84F3-28E87B81E6E6}" destId="{0008B0B5-378A-461B-BACD-F0CCCDAAAB96}" srcOrd="2" destOrd="0" parTransId="{066E1EBD-FC90-4A76-96FB-E6B1BF8651AD}" sibTransId="{8A9DE253-C0D2-4BEB-84E6-7DFD06B198A5}"/>
+    <dgm:cxn modelId="{23633907-9FFE-4EF0-9F19-F443B5B4C0B8}" type="presOf" srcId="{6548054A-FDD4-4357-B790-7D006062E663}" destId="{22B377EF-E448-456D-9679-6E3F43C2FBCA}" srcOrd="0" destOrd="0" presId="urn:microsoft.com/office/officeart/2005/8/layout/cycle8"/>
+    <dgm:cxn modelId="{1D60974D-30A6-4F09-BFE4-BD9167846239}" type="presOf" srcId="{4AEC9B94-5F27-4E35-9321-4763F9E7E5EA}" destId="{FA1BAB0B-49FE-4E7F-BED7-DD77ED486817}" srcOrd="1" destOrd="0" presId="urn:microsoft.com/office/officeart/2005/8/layout/cycle8"/>
+    <dgm:cxn modelId="{A324DDF5-3C74-4C07-9496-F28F342318D3}" type="presOf" srcId="{3153A1D2-16A8-4DBB-84F3-28E87B81E6E6}" destId="{2278CBBC-5F9A-4335-8540-DD93F46C657A}" srcOrd="0" destOrd="0" presId="urn:microsoft.com/office/officeart/2005/8/layout/cycle8"/>
+    <dgm:cxn modelId="{D756016C-5977-4CAF-B922-7751DEA6432A}" type="presOf" srcId="{6548054A-FDD4-4357-B790-7D006062E663}" destId="{6802B5AB-DB27-42AC-AE1E-257634E02559}" srcOrd="1" destOrd="0" presId="urn:microsoft.com/office/officeart/2005/8/layout/cycle8"/>
+    <dgm:cxn modelId="{EF4D427E-90B1-4DAE-BF8F-991C51EAC960}" type="presOf" srcId="{0008B0B5-378A-461B-BACD-F0CCCDAAAB96}" destId="{075A10BF-F58B-4399-B76F-5FBBFA542012}" srcOrd="0" destOrd="0" presId="urn:microsoft.com/office/officeart/2005/8/layout/cycle8"/>
+    <dgm:cxn modelId="{2B9CE425-016B-4290-9FEB-12CDCFE9046F}" type="presOf" srcId="{C6A0BE9F-F376-481C-9613-A3D7644667C1}" destId="{87EF04A0-496E-4674-BFA0-D541BE54BA23}" srcOrd="0" destOrd="0" presId="urn:microsoft.com/office/officeart/2005/8/layout/cycle8"/>
     <dgm:cxn modelId="{23CEC309-563D-4A68-8333-38BBBF0E5936}" srcId="{3153A1D2-16A8-4DBB-84F3-28E87B81E6E6}" destId="{4AEC9B94-5F27-4E35-9321-4763F9E7E5EA}" srcOrd="0" destOrd="0" parTransId="{B0D722C3-565D-4AE7-AC16-4CE120D344D0}" sibTransId="{CEEA2631-46BC-47B5-B572-1E3A0A9D83E4}"/>
     <dgm:cxn modelId="{949FE8BF-C8C8-42B1-A8A5-2BA6780AC341}" srcId="{3153A1D2-16A8-4DBB-84F3-28E87B81E6E6}" destId="{6548054A-FDD4-4357-B790-7D006062E663}" srcOrd="3" destOrd="0" parTransId="{37F3717C-7CB6-43F3-B9E9-C958ABEC5B09}" sibTransId="{D874E9AB-D627-4A64-B18F-C42A600B7865}"/>
-    <dgm:cxn modelId="{1D60974D-30A6-4F09-BFE4-BD9167846239}" type="presOf" srcId="{4AEC9B94-5F27-4E35-9321-4763F9E7E5EA}" destId="{FA1BAB0B-49FE-4E7F-BED7-DD77ED486817}" srcOrd="1" destOrd="0" presId="urn:microsoft.com/office/officeart/2005/8/layout/cycle8"/>
-    <dgm:cxn modelId="{2B9CE425-016B-4290-9FEB-12CDCFE9046F}" type="presOf" srcId="{C6A0BE9F-F376-481C-9613-A3D7644667C1}" destId="{87EF04A0-496E-4674-BFA0-D541BE54BA23}" srcOrd="0" destOrd="0" presId="urn:microsoft.com/office/officeart/2005/8/layout/cycle8"/>
-    <dgm:cxn modelId="{23633907-9FFE-4EF0-9F19-F443B5B4C0B8}" type="presOf" srcId="{6548054A-FDD4-4357-B790-7D006062E663}" destId="{22B377EF-E448-456D-9679-6E3F43C2FBCA}" srcOrd="0" destOrd="0" presId="urn:microsoft.com/office/officeart/2005/8/layout/cycle8"/>
-    <dgm:cxn modelId="{97EE3899-3984-41E6-8A02-EAD9B656539A}" type="presOf" srcId="{C6A0BE9F-F376-481C-9613-A3D7644667C1}" destId="{FC0A315E-FAAF-4FA6-8B74-CD8D52EDCF6E}" srcOrd="1" destOrd="0" presId="urn:microsoft.com/office/officeart/2005/8/layout/cycle8"/>
-    <dgm:cxn modelId="{EF4D427E-90B1-4DAE-BF8F-991C51EAC960}" type="presOf" srcId="{0008B0B5-378A-461B-BACD-F0CCCDAAAB96}" destId="{075A10BF-F58B-4399-B76F-5FBBFA542012}" srcOrd="0" destOrd="0" presId="urn:microsoft.com/office/officeart/2005/8/layout/cycle8"/>
     <dgm:cxn modelId="{54FB5D9A-FDE5-49C9-B800-F0F30D883E6B}" type="presOf" srcId="{0008B0B5-378A-461B-BACD-F0CCCDAAAB96}" destId="{7D3AEFBB-B8D5-4C28-A33C-9F20270AA858}" srcOrd="1" destOrd="0" presId="urn:microsoft.com/office/officeart/2005/8/layout/cycle8"/>
-    <dgm:cxn modelId="{177A6C31-0FC5-490C-9C0E-60590FDDEF08}" srcId="{3153A1D2-16A8-4DBB-84F3-28E87B81E6E6}" destId="{0008B0B5-378A-461B-BACD-F0CCCDAAAB96}" srcOrd="2" destOrd="0" parTransId="{066E1EBD-FC90-4A76-96FB-E6B1BF8651AD}" sibTransId="{8A9DE253-C0D2-4BEB-84E6-7DFD06B198A5}"/>
-    <dgm:cxn modelId="{A324DDF5-3C74-4C07-9496-F28F342318D3}" type="presOf" srcId="{3153A1D2-16A8-4DBB-84F3-28E87B81E6E6}" destId="{2278CBBC-5F9A-4335-8540-DD93F46C657A}" srcOrd="0" destOrd="0" presId="urn:microsoft.com/office/officeart/2005/8/layout/cycle8"/>
-    <dgm:cxn modelId="{BDF7B244-A5A4-4F0B-B577-5BEEAC3D8FAC}" type="presOf" srcId="{4AEC9B94-5F27-4E35-9321-4763F9E7E5EA}" destId="{5A2FB032-CC70-4B51-A7B3-CB0733FA716E}" srcOrd="0" destOrd="0" presId="urn:microsoft.com/office/officeart/2005/8/layout/cycle8"/>
-    <dgm:cxn modelId="{D756016C-5977-4CAF-B922-7751DEA6432A}" type="presOf" srcId="{6548054A-FDD4-4357-B790-7D006062E663}" destId="{6802B5AB-DB27-42AC-AE1E-257634E02559}" srcOrd="1" destOrd="0" presId="urn:microsoft.com/office/officeart/2005/8/layout/cycle8"/>
-    <dgm:cxn modelId="{F2151A12-92B4-43F8-898C-4661EE46B409}" srcId="{3153A1D2-16A8-4DBB-84F3-28E87B81E6E6}" destId="{C6A0BE9F-F376-481C-9613-A3D7644667C1}" srcOrd="1" destOrd="0" parTransId="{C4A7BF10-C84F-41B3-A55A-5D848F23350B}" sibTransId="{9F364941-B691-42C3-B831-22C535DC9890}"/>
     <dgm:cxn modelId="{07F6FDFB-B5EF-40CC-9D30-BC2BE958B7AD}" type="presParOf" srcId="{2278CBBC-5F9A-4335-8540-DD93F46C657A}" destId="{5A2FB032-CC70-4B51-A7B3-CB0733FA716E}" srcOrd="0" destOrd="0" presId="urn:microsoft.com/office/officeart/2005/8/layout/cycle8"/>
     <dgm:cxn modelId="{6EBED7D5-1B6B-48B3-A8F8-7F6FA5CB9FD0}" type="presParOf" srcId="{2278CBBC-5F9A-4335-8540-DD93F46C657A}" destId="{E7A23E98-94EA-422D-B37F-9A30D81C6B94}" srcOrd="1" destOrd="0" presId="urn:microsoft.com/office/officeart/2005/8/layout/cycle8"/>
     <dgm:cxn modelId="{A32CCA46-F62E-4A45-A544-C8A7679D045A}" type="presParOf" srcId="{2278CBBC-5F9A-4335-8540-DD93F46C657A}" destId="{61E36056-C521-41B6-966E-2EEAE3C355C4}" srcOrd="2" destOrd="0" presId="urn:microsoft.com/office/officeart/2005/8/layout/cycle8"/>
@@ -3559,662 +3648,6 @@
       <dsp:cNvGrpSpPr/>
     </dsp:nvGrpSpPr>
     <dsp:grpSpPr/>
-    <dsp:sp modelId="{5A2FB032-CC70-4B51-A7B3-CB0733FA716E}">
-      <dsp:nvSpPr>
-        <dsp:cNvPr id="0" name=""/>
-        <dsp:cNvSpPr/>
-      </dsp:nvSpPr>
-      <dsp:spPr>
-        <a:xfrm>
-          <a:off x="399615" y="164219"/>
-          <a:ext cx="2322676" cy="2322676"/>
-        </a:xfrm>
-        <a:prstGeom prst="pie">
-          <a:avLst>
-            <a:gd name="adj1" fmla="val 16200000"/>
-            <a:gd name="adj2" fmla="val 0"/>
-          </a:avLst>
-        </a:prstGeom>
-        <a:gradFill rotWithShape="0">
-          <a:gsLst>
-            <a:gs pos="0">
-              <a:schemeClr val="lt1">
-                <a:hueOff val="0"/>
-                <a:satOff val="0"/>
-                <a:lumOff val="0"/>
-                <a:alphaOff val="0"/>
-                <a:tint val="98000"/>
-                <a:lumMod val="114000"/>
-              </a:schemeClr>
-            </a:gs>
-            <a:gs pos="100000">
-              <a:schemeClr val="lt1">
-                <a:hueOff val="0"/>
-                <a:satOff val="0"/>
-                <a:lumOff val="0"/>
-                <a:alphaOff val="0"/>
-                <a:shade val="90000"/>
-                <a:lumMod val="84000"/>
-              </a:schemeClr>
-            </a:gs>
-          </a:gsLst>
-          <a:lin ang="5400000" scaled="0"/>
-        </a:gradFill>
-        <a:ln>
-          <a:noFill/>
-        </a:ln>
-        <a:effectLst>
-          <a:outerShdw blurRad="38100" dist="25400" dir="5400000" rotWithShape="0">
-            <a:srgbClr val="000000">
-              <a:alpha val="45000"/>
-            </a:srgbClr>
-          </a:outerShdw>
-        </a:effectLst>
-      </dsp:spPr>
-      <dsp:style>
-        <a:lnRef idx="0">
-          <a:scrgbClr r="0" g="0" b="0"/>
-        </a:lnRef>
-        <a:fillRef idx="3">
-          <a:scrgbClr r="0" g="0" b="0"/>
-        </a:fillRef>
-        <a:effectRef idx="2">
-          <a:scrgbClr r="0" g="0" b="0"/>
-        </a:effectRef>
-        <a:fontRef idx="minor">
-          <a:schemeClr val="lt1"/>
-        </a:fontRef>
-      </dsp:style>
-      <dsp:txBody>
-        <a:bodyPr spcFirstLastPara="0" vert="horz" wrap="square" lIns="21590" tIns="21590" rIns="21590" bIns="21590" numCol="1" spcCol="1270" anchor="ctr" anchorCtr="0">
-          <a:noAutofit/>
-        </a:bodyPr>
-        <a:lstStyle/>
-        <a:p>
-          <a:pPr lvl="0" algn="ctr" defTabSz="755650">
-            <a:lnSpc>
-              <a:spcPct val="90000"/>
-            </a:lnSpc>
-            <a:spcBef>
-              <a:spcPct val="0"/>
-            </a:spcBef>
-            <a:spcAft>
-              <a:spcPct val="35000"/>
-            </a:spcAft>
-          </a:pPr>
-          <a:r>
-            <a:rPr lang="en-US" sz="1700" kern="1200" dirty="0" smtClean="0"/>
-            <a:t>DEMO1</a:t>
-          </a:r>
-          <a:endParaRPr lang="en-US" sz="1700" kern="1200" dirty="0"/>
-        </a:p>
-      </dsp:txBody>
-      <dsp:txXfrm>
-        <a:off x="1632569" y="645621"/>
-        <a:ext cx="857178" cy="635970"/>
-      </dsp:txXfrm>
-    </dsp:sp>
-    <dsp:sp modelId="{87EF04A0-496E-4674-BFA0-D541BE54BA23}">
-      <dsp:nvSpPr>
-        <dsp:cNvPr id="0" name=""/>
-        <dsp:cNvSpPr/>
-      </dsp:nvSpPr>
-      <dsp:spPr>
-        <a:xfrm>
-          <a:off x="399615" y="242195"/>
-          <a:ext cx="2322676" cy="2322676"/>
-        </a:xfrm>
-        <a:prstGeom prst="pie">
-          <a:avLst>
-            <a:gd name="adj1" fmla="val 0"/>
-            <a:gd name="adj2" fmla="val 5400000"/>
-          </a:avLst>
-        </a:prstGeom>
-        <a:gradFill rotWithShape="0">
-          <a:gsLst>
-            <a:gs pos="0">
-              <a:schemeClr val="lt1">
-                <a:hueOff val="0"/>
-                <a:satOff val="0"/>
-                <a:lumOff val="0"/>
-                <a:alphaOff val="0"/>
-                <a:tint val="98000"/>
-                <a:lumMod val="114000"/>
-              </a:schemeClr>
-            </a:gs>
-            <a:gs pos="100000">
-              <a:schemeClr val="lt1">
-                <a:hueOff val="0"/>
-                <a:satOff val="0"/>
-                <a:lumOff val="0"/>
-                <a:alphaOff val="0"/>
-                <a:shade val="90000"/>
-                <a:lumMod val="84000"/>
-              </a:schemeClr>
-            </a:gs>
-          </a:gsLst>
-          <a:lin ang="5400000" scaled="0"/>
-        </a:gradFill>
-        <a:ln>
-          <a:noFill/>
-        </a:ln>
-        <a:effectLst>
-          <a:outerShdw blurRad="38100" dist="25400" dir="5400000" rotWithShape="0">
-            <a:srgbClr val="000000">
-              <a:alpha val="45000"/>
-            </a:srgbClr>
-          </a:outerShdw>
-        </a:effectLst>
-      </dsp:spPr>
-      <dsp:style>
-        <a:lnRef idx="0">
-          <a:scrgbClr r="0" g="0" b="0"/>
-        </a:lnRef>
-        <a:fillRef idx="3">
-          <a:scrgbClr r="0" g="0" b="0"/>
-        </a:fillRef>
-        <a:effectRef idx="2">
-          <a:scrgbClr r="0" g="0" b="0"/>
-        </a:effectRef>
-        <a:fontRef idx="minor">
-          <a:schemeClr val="lt1"/>
-        </a:fontRef>
-      </dsp:style>
-      <dsp:txBody>
-        <a:bodyPr spcFirstLastPara="0" vert="horz" wrap="square" lIns="21590" tIns="21590" rIns="21590" bIns="21590" numCol="1" spcCol="1270" anchor="ctr" anchorCtr="0">
-          <a:noAutofit/>
-        </a:bodyPr>
-        <a:lstStyle/>
-        <a:p>
-          <a:pPr lvl="0" algn="ctr" defTabSz="755650">
-            <a:lnSpc>
-              <a:spcPct val="90000"/>
-            </a:lnSpc>
-            <a:spcBef>
-              <a:spcPct val="0"/>
-            </a:spcBef>
-            <a:spcAft>
-              <a:spcPct val="35000"/>
-            </a:spcAft>
-          </a:pPr>
-          <a:endParaRPr lang="en-US" sz="1700" kern="1200" dirty="0"/>
-        </a:p>
-      </dsp:txBody>
-      <dsp:txXfrm>
-        <a:off x="1632569" y="1447498"/>
-        <a:ext cx="857178" cy="635970"/>
-      </dsp:txXfrm>
-    </dsp:sp>
-    <dsp:sp modelId="{075A10BF-F58B-4399-B76F-5FBBFA542012}">
-      <dsp:nvSpPr>
-        <dsp:cNvPr id="0" name=""/>
-        <dsp:cNvSpPr/>
-      </dsp:nvSpPr>
-      <dsp:spPr>
-        <a:xfrm>
-          <a:off x="321639" y="242195"/>
-          <a:ext cx="2322676" cy="2322676"/>
-        </a:xfrm>
-        <a:prstGeom prst="pie">
-          <a:avLst>
-            <a:gd name="adj1" fmla="val 5400000"/>
-            <a:gd name="adj2" fmla="val 10800000"/>
-          </a:avLst>
-        </a:prstGeom>
-        <a:gradFill rotWithShape="0">
-          <a:gsLst>
-            <a:gs pos="0">
-              <a:schemeClr val="lt1">
-                <a:hueOff val="0"/>
-                <a:satOff val="0"/>
-                <a:lumOff val="0"/>
-                <a:alphaOff val="0"/>
-                <a:tint val="98000"/>
-                <a:lumMod val="114000"/>
-              </a:schemeClr>
-            </a:gs>
-            <a:gs pos="100000">
-              <a:schemeClr val="lt1">
-                <a:hueOff val="0"/>
-                <a:satOff val="0"/>
-                <a:lumOff val="0"/>
-                <a:alphaOff val="0"/>
-                <a:shade val="90000"/>
-                <a:lumMod val="84000"/>
-              </a:schemeClr>
-            </a:gs>
-          </a:gsLst>
-          <a:lin ang="5400000" scaled="0"/>
-        </a:gradFill>
-        <a:ln>
-          <a:noFill/>
-        </a:ln>
-        <a:effectLst>
-          <a:outerShdw blurRad="38100" dist="25400" dir="5400000" rotWithShape="0">
-            <a:srgbClr val="000000">
-              <a:alpha val="45000"/>
-            </a:srgbClr>
-          </a:outerShdw>
-        </a:effectLst>
-      </dsp:spPr>
-      <dsp:style>
-        <a:lnRef idx="0">
-          <a:scrgbClr r="0" g="0" b="0"/>
-        </a:lnRef>
-        <a:fillRef idx="3">
-          <a:scrgbClr r="0" g="0" b="0"/>
-        </a:fillRef>
-        <a:effectRef idx="2">
-          <a:scrgbClr r="0" g="0" b="0"/>
-        </a:effectRef>
-        <a:fontRef idx="minor">
-          <a:schemeClr val="lt1"/>
-        </a:fontRef>
-      </dsp:style>
-      <dsp:txBody>
-        <a:bodyPr spcFirstLastPara="0" vert="horz" wrap="square" lIns="21590" tIns="21590" rIns="21590" bIns="21590" numCol="1" spcCol="1270" anchor="ctr" anchorCtr="0">
-          <a:noAutofit/>
-        </a:bodyPr>
-        <a:lstStyle/>
-        <a:p>
-          <a:pPr lvl="0" algn="ctr" defTabSz="755650">
-            <a:lnSpc>
-              <a:spcPct val="90000"/>
-            </a:lnSpc>
-            <a:spcBef>
-              <a:spcPct val="0"/>
-            </a:spcBef>
-            <a:spcAft>
-              <a:spcPct val="35000"/>
-            </a:spcAft>
-          </a:pPr>
-          <a:endParaRPr lang="en-US" sz="1700" kern="1200" dirty="0"/>
-        </a:p>
-      </dsp:txBody>
-      <dsp:txXfrm>
-        <a:off x="554184" y="1447498"/>
-        <a:ext cx="857178" cy="635970"/>
-      </dsp:txXfrm>
-    </dsp:sp>
-    <dsp:sp modelId="{22B377EF-E448-456D-9679-6E3F43C2FBCA}">
-      <dsp:nvSpPr>
-        <dsp:cNvPr id="0" name=""/>
-        <dsp:cNvSpPr/>
-      </dsp:nvSpPr>
-      <dsp:spPr>
-        <a:xfrm>
-          <a:off x="321639" y="164219"/>
-          <a:ext cx="2322676" cy="2322676"/>
-        </a:xfrm>
-        <a:prstGeom prst="pie">
-          <a:avLst>
-            <a:gd name="adj1" fmla="val 10800000"/>
-            <a:gd name="adj2" fmla="val 16200000"/>
-          </a:avLst>
-        </a:prstGeom>
-        <a:gradFill rotWithShape="0">
-          <a:gsLst>
-            <a:gs pos="0">
-              <a:schemeClr val="lt1">
-                <a:hueOff val="0"/>
-                <a:satOff val="0"/>
-                <a:lumOff val="0"/>
-                <a:alphaOff val="0"/>
-                <a:tint val="98000"/>
-                <a:lumMod val="114000"/>
-              </a:schemeClr>
-            </a:gs>
-            <a:gs pos="100000">
-              <a:schemeClr val="lt1">
-                <a:hueOff val="0"/>
-                <a:satOff val="0"/>
-                <a:lumOff val="0"/>
-                <a:alphaOff val="0"/>
-                <a:shade val="90000"/>
-                <a:lumMod val="84000"/>
-              </a:schemeClr>
-            </a:gs>
-          </a:gsLst>
-          <a:lin ang="5400000" scaled="0"/>
-        </a:gradFill>
-        <a:ln>
-          <a:noFill/>
-        </a:ln>
-        <a:effectLst>
-          <a:outerShdw blurRad="38100" dist="25400" dir="5400000" rotWithShape="0">
-            <a:srgbClr val="000000">
-              <a:alpha val="45000"/>
-            </a:srgbClr>
-          </a:outerShdw>
-        </a:effectLst>
-      </dsp:spPr>
-      <dsp:style>
-        <a:lnRef idx="0">
-          <a:scrgbClr r="0" g="0" b="0"/>
-        </a:lnRef>
-        <a:fillRef idx="3">
-          <a:scrgbClr r="0" g="0" b="0"/>
-        </a:fillRef>
-        <a:effectRef idx="2">
-          <a:scrgbClr r="0" g="0" b="0"/>
-        </a:effectRef>
-        <a:fontRef idx="minor">
-          <a:schemeClr val="lt1"/>
-        </a:fontRef>
-      </dsp:style>
-      <dsp:txBody>
-        <a:bodyPr spcFirstLastPara="0" vert="horz" wrap="square" lIns="21590" tIns="21590" rIns="21590" bIns="21590" numCol="1" spcCol="1270" anchor="ctr" anchorCtr="0">
-          <a:noAutofit/>
-        </a:bodyPr>
-        <a:lstStyle/>
-        <a:p>
-          <a:pPr lvl="0" algn="ctr" defTabSz="755650">
-            <a:lnSpc>
-              <a:spcPct val="90000"/>
-            </a:lnSpc>
-            <a:spcBef>
-              <a:spcPct val="0"/>
-            </a:spcBef>
-            <a:spcAft>
-              <a:spcPct val="35000"/>
-            </a:spcAft>
-          </a:pPr>
-          <a:endParaRPr lang="en-US" sz="1700" kern="1200"/>
-        </a:p>
-      </dsp:txBody>
-      <dsp:txXfrm>
-        <a:off x="554184" y="645621"/>
-        <a:ext cx="857178" cy="635970"/>
-      </dsp:txXfrm>
-    </dsp:sp>
-    <dsp:sp modelId="{2B40289F-58CE-4AFF-B3B1-90EA6F0AD4AA}">
-      <dsp:nvSpPr>
-        <dsp:cNvPr id="0" name=""/>
-        <dsp:cNvSpPr/>
-      </dsp:nvSpPr>
-      <dsp:spPr>
-        <a:xfrm>
-          <a:off x="255830" y="20434"/>
-          <a:ext cx="2610245" cy="2610245"/>
-        </a:xfrm>
-        <a:prstGeom prst="circularArrow">
-          <a:avLst>
-            <a:gd name="adj1" fmla="val 5085"/>
-            <a:gd name="adj2" fmla="val 327528"/>
-            <a:gd name="adj3" fmla="val 21272472"/>
-            <a:gd name="adj4" fmla="val 16200000"/>
-            <a:gd name="adj5" fmla="val 5932"/>
-          </a:avLst>
-        </a:prstGeom>
-        <a:gradFill rotWithShape="0">
-          <a:gsLst>
-            <a:gs pos="0">
-              <a:schemeClr val="dk2">
-                <a:tint val="60000"/>
-                <a:hueOff val="0"/>
-                <a:satOff val="0"/>
-                <a:lumOff val="0"/>
-                <a:alphaOff val="0"/>
-                <a:tint val="98000"/>
-                <a:lumMod val="114000"/>
-              </a:schemeClr>
-            </a:gs>
-            <a:gs pos="100000">
-              <a:schemeClr val="dk2">
-                <a:tint val="60000"/>
-                <a:hueOff val="0"/>
-                <a:satOff val="0"/>
-                <a:lumOff val="0"/>
-                <a:alphaOff val="0"/>
-                <a:shade val="90000"/>
-                <a:lumMod val="84000"/>
-              </a:schemeClr>
-            </a:gs>
-          </a:gsLst>
-          <a:lin ang="5400000" scaled="0"/>
-        </a:gradFill>
-        <a:ln>
-          <a:noFill/>
-        </a:ln>
-        <a:effectLst>
-          <a:outerShdw blurRad="38100" dist="25400" dir="5400000" rotWithShape="0">
-            <a:srgbClr val="000000">
-              <a:alpha val="45000"/>
-            </a:srgbClr>
-          </a:outerShdw>
-        </a:effectLst>
-      </dsp:spPr>
-      <dsp:style>
-        <a:lnRef idx="0">
-          <a:scrgbClr r="0" g="0" b="0"/>
-        </a:lnRef>
-        <a:fillRef idx="3">
-          <a:scrgbClr r="0" g="0" b="0"/>
-        </a:fillRef>
-        <a:effectRef idx="2">
-          <a:scrgbClr r="0" g="0" b="0"/>
-        </a:effectRef>
-        <a:fontRef idx="minor">
-          <a:schemeClr val="lt1"/>
-        </a:fontRef>
-      </dsp:style>
-    </dsp:sp>
-    <dsp:sp modelId="{76255BB8-E339-40C0-AFA8-AD87F601C736}">
-      <dsp:nvSpPr>
-        <dsp:cNvPr id="0" name=""/>
-        <dsp:cNvSpPr/>
-      </dsp:nvSpPr>
-      <dsp:spPr>
-        <a:xfrm>
-          <a:off x="255830" y="98410"/>
-          <a:ext cx="2610245" cy="2610245"/>
-        </a:xfrm>
-        <a:prstGeom prst="circularArrow">
-          <a:avLst>
-            <a:gd name="adj1" fmla="val 5085"/>
-            <a:gd name="adj2" fmla="val 327528"/>
-            <a:gd name="adj3" fmla="val 5072472"/>
-            <a:gd name="adj4" fmla="val 0"/>
-            <a:gd name="adj5" fmla="val 5932"/>
-          </a:avLst>
-        </a:prstGeom>
-        <a:gradFill rotWithShape="0">
-          <a:gsLst>
-            <a:gs pos="0">
-              <a:schemeClr val="dk2">
-                <a:tint val="60000"/>
-                <a:hueOff val="0"/>
-                <a:satOff val="0"/>
-                <a:lumOff val="0"/>
-                <a:alphaOff val="0"/>
-                <a:tint val="98000"/>
-                <a:lumMod val="114000"/>
-              </a:schemeClr>
-            </a:gs>
-            <a:gs pos="100000">
-              <a:schemeClr val="dk2">
-                <a:tint val="60000"/>
-                <a:hueOff val="0"/>
-                <a:satOff val="0"/>
-                <a:lumOff val="0"/>
-                <a:alphaOff val="0"/>
-                <a:shade val="90000"/>
-                <a:lumMod val="84000"/>
-              </a:schemeClr>
-            </a:gs>
-          </a:gsLst>
-          <a:lin ang="5400000" scaled="0"/>
-        </a:gradFill>
-        <a:ln>
-          <a:noFill/>
-        </a:ln>
-        <a:effectLst>
-          <a:outerShdw blurRad="38100" dist="25400" dir="5400000" rotWithShape="0">
-            <a:srgbClr val="000000">
-              <a:alpha val="45000"/>
-            </a:srgbClr>
-          </a:outerShdw>
-        </a:effectLst>
-      </dsp:spPr>
-      <dsp:style>
-        <a:lnRef idx="0">
-          <a:scrgbClr r="0" g="0" b="0"/>
-        </a:lnRef>
-        <a:fillRef idx="3">
-          <a:scrgbClr r="0" g="0" b="0"/>
-        </a:fillRef>
-        <a:effectRef idx="2">
-          <a:scrgbClr r="0" g="0" b="0"/>
-        </a:effectRef>
-        <a:fontRef idx="minor">
-          <a:schemeClr val="lt1"/>
-        </a:fontRef>
-      </dsp:style>
-    </dsp:sp>
-    <dsp:sp modelId="{EC44A464-B054-45D6-9E76-5E5ADF360E05}">
-      <dsp:nvSpPr>
-        <dsp:cNvPr id="0" name=""/>
-        <dsp:cNvSpPr/>
-      </dsp:nvSpPr>
-      <dsp:spPr>
-        <a:xfrm>
-          <a:off x="177855" y="98410"/>
-          <a:ext cx="2610245" cy="2610245"/>
-        </a:xfrm>
-        <a:prstGeom prst="circularArrow">
-          <a:avLst>
-            <a:gd name="adj1" fmla="val 5085"/>
-            <a:gd name="adj2" fmla="val 327528"/>
-            <a:gd name="adj3" fmla="val 10472472"/>
-            <a:gd name="adj4" fmla="val 5400000"/>
-            <a:gd name="adj5" fmla="val 5932"/>
-          </a:avLst>
-        </a:prstGeom>
-        <a:gradFill rotWithShape="0">
-          <a:gsLst>
-            <a:gs pos="0">
-              <a:schemeClr val="dk2">
-                <a:tint val="60000"/>
-                <a:hueOff val="0"/>
-                <a:satOff val="0"/>
-                <a:lumOff val="0"/>
-                <a:alphaOff val="0"/>
-                <a:tint val="98000"/>
-                <a:lumMod val="114000"/>
-              </a:schemeClr>
-            </a:gs>
-            <a:gs pos="100000">
-              <a:schemeClr val="dk2">
-                <a:tint val="60000"/>
-                <a:hueOff val="0"/>
-                <a:satOff val="0"/>
-                <a:lumOff val="0"/>
-                <a:alphaOff val="0"/>
-                <a:shade val="90000"/>
-                <a:lumMod val="84000"/>
-              </a:schemeClr>
-            </a:gs>
-          </a:gsLst>
-          <a:lin ang="5400000" scaled="0"/>
-        </a:gradFill>
-        <a:ln>
-          <a:noFill/>
-        </a:ln>
-        <a:effectLst>
-          <a:outerShdw blurRad="38100" dist="25400" dir="5400000" rotWithShape="0">
-            <a:srgbClr val="000000">
-              <a:alpha val="45000"/>
-            </a:srgbClr>
-          </a:outerShdw>
-        </a:effectLst>
-      </dsp:spPr>
-      <dsp:style>
-        <a:lnRef idx="0">
-          <a:scrgbClr r="0" g="0" b="0"/>
-        </a:lnRef>
-        <a:fillRef idx="3">
-          <a:scrgbClr r="0" g="0" b="0"/>
-        </a:fillRef>
-        <a:effectRef idx="2">
-          <a:scrgbClr r="0" g="0" b="0"/>
-        </a:effectRef>
-        <a:fontRef idx="minor">
-          <a:schemeClr val="lt1"/>
-        </a:fontRef>
-      </dsp:style>
-    </dsp:sp>
-    <dsp:sp modelId="{E4DAE667-71E2-4F50-B78C-6055BEC443FB}">
-      <dsp:nvSpPr>
-        <dsp:cNvPr id="0" name=""/>
-        <dsp:cNvSpPr/>
-      </dsp:nvSpPr>
-      <dsp:spPr>
-        <a:xfrm>
-          <a:off x="177855" y="20434"/>
-          <a:ext cx="2610245" cy="2610245"/>
-        </a:xfrm>
-        <a:prstGeom prst="circularArrow">
-          <a:avLst>
-            <a:gd name="adj1" fmla="val 5085"/>
-            <a:gd name="adj2" fmla="val 327528"/>
-            <a:gd name="adj3" fmla="val 15872472"/>
-            <a:gd name="adj4" fmla="val 10800000"/>
-            <a:gd name="adj5" fmla="val 5932"/>
-          </a:avLst>
-        </a:prstGeom>
-        <a:gradFill rotWithShape="0">
-          <a:gsLst>
-            <a:gs pos="0">
-              <a:schemeClr val="dk2">
-                <a:tint val="60000"/>
-                <a:hueOff val="0"/>
-                <a:satOff val="0"/>
-                <a:lumOff val="0"/>
-                <a:alphaOff val="0"/>
-                <a:tint val="98000"/>
-                <a:lumMod val="114000"/>
-              </a:schemeClr>
-            </a:gs>
-            <a:gs pos="100000">
-              <a:schemeClr val="dk2">
-                <a:tint val="60000"/>
-                <a:hueOff val="0"/>
-                <a:satOff val="0"/>
-                <a:lumOff val="0"/>
-                <a:alphaOff val="0"/>
-                <a:shade val="90000"/>
-                <a:lumMod val="84000"/>
-              </a:schemeClr>
-            </a:gs>
-          </a:gsLst>
-          <a:lin ang="5400000" scaled="0"/>
-        </a:gradFill>
-        <a:ln>
-          <a:noFill/>
-        </a:ln>
-        <a:effectLst>
-          <a:outerShdw blurRad="38100" dist="25400" dir="5400000" rotWithShape="0">
-            <a:srgbClr val="000000">
-              <a:alpha val="45000"/>
-            </a:srgbClr>
-          </a:outerShdw>
-        </a:effectLst>
-      </dsp:spPr>
-      <dsp:style>
-        <a:lnRef idx="0">
-          <a:scrgbClr r="0" g="0" b="0"/>
-        </a:lnRef>
-        <a:fillRef idx="3">
-          <a:scrgbClr r="0" g="0" b="0"/>
-        </a:fillRef>
-        <a:effectRef idx="2">
-          <a:scrgbClr r="0" g="0" b="0"/>
-        </a:effectRef>
-        <a:fontRef idx="minor">
-          <a:schemeClr val="lt1"/>
-        </a:fontRef>
-      </dsp:style>
-    </dsp:sp>
   </dsp:spTree>
 </dsp:drawing>
 </file>
@@ -4227,662 +3660,6 @@
       <dsp:cNvGrpSpPr/>
     </dsp:nvGrpSpPr>
     <dsp:grpSpPr/>
-    <dsp:sp modelId="{5A2FB032-CC70-4B51-A7B3-CB0733FA716E}">
-      <dsp:nvSpPr>
-        <dsp:cNvPr id="0" name=""/>
-        <dsp:cNvSpPr/>
-      </dsp:nvSpPr>
-      <dsp:spPr>
-        <a:xfrm>
-          <a:off x="399615" y="164219"/>
-          <a:ext cx="2322676" cy="2322676"/>
-        </a:xfrm>
-        <a:prstGeom prst="pie">
-          <a:avLst>
-            <a:gd name="adj1" fmla="val 16200000"/>
-            <a:gd name="adj2" fmla="val 0"/>
-          </a:avLst>
-        </a:prstGeom>
-        <a:gradFill rotWithShape="0">
-          <a:gsLst>
-            <a:gs pos="0">
-              <a:schemeClr val="lt1">
-                <a:hueOff val="0"/>
-                <a:satOff val="0"/>
-                <a:lumOff val="0"/>
-                <a:alphaOff val="0"/>
-                <a:tint val="98000"/>
-                <a:lumMod val="114000"/>
-              </a:schemeClr>
-            </a:gs>
-            <a:gs pos="100000">
-              <a:schemeClr val="lt1">
-                <a:hueOff val="0"/>
-                <a:satOff val="0"/>
-                <a:lumOff val="0"/>
-                <a:alphaOff val="0"/>
-                <a:shade val="90000"/>
-                <a:lumMod val="84000"/>
-              </a:schemeClr>
-            </a:gs>
-          </a:gsLst>
-          <a:lin ang="5400000" scaled="0"/>
-        </a:gradFill>
-        <a:ln>
-          <a:noFill/>
-        </a:ln>
-        <a:effectLst>
-          <a:outerShdw blurRad="38100" dist="25400" dir="5400000" rotWithShape="0">
-            <a:srgbClr val="000000">
-              <a:alpha val="45000"/>
-            </a:srgbClr>
-          </a:outerShdw>
-        </a:effectLst>
-      </dsp:spPr>
-      <dsp:style>
-        <a:lnRef idx="0">
-          <a:scrgbClr r="0" g="0" b="0"/>
-        </a:lnRef>
-        <a:fillRef idx="3">
-          <a:scrgbClr r="0" g="0" b="0"/>
-        </a:fillRef>
-        <a:effectRef idx="2">
-          <a:scrgbClr r="0" g="0" b="0"/>
-        </a:effectRef>
-        <a:fontRef idx="minor">
-          <a:schemeClr val="lt1"/>
-        </a:fontRef>
-      </dsp:style>
-      <dsp:txBody>
-        <a:bodyPr spcFirstLastPara="0" vert="horz" wrap="square" lIns="21590" tIns="21590" rIns="21590" bIns="21590" numCol="1" spcCol="1270" anchor="ctr" anchorCtr="0">
-          <a:noAutofit/>
-        </a:bodyPr>
-        <a:lstStyle/>
-        <a:p>
-          <a:pPr lvl="0" algn="ctr" defTabSz="755650">
-            <a:lnSpc>
-              <a:spcPct val="90000"/>
-            </a:lnSpc>
-            <a:spcBef>
-              <a:spcPct val="0"/>
-            </a:spcBef>
-            <a:spcAft>
-              <a:spcPct val="35000"/>
-            </a:spcAft>
-          </a:pPr>
-          <a:endParaRPr lang="en-US" sz="1700" kern="1200" dirty="0"/>
-        </a:p>
-      </dsp:txBody>
-      <dsp:txXfrm>
-        <a:off x="1632569" y="645621"/>
-        <a:ext cx="857178" cy="635970"/>
-      </dsp:txXfrm>
-    </dsp:sp>
-    <dsp:sp modelId="{87EF04A0-496E-4674-BFA0-D541BE54BA23}">
-      <dsp:nvSpPr>
-        <dsp:cNvPr id="0" name=""/>
-        <dsp:cNvSpPr/>
-      </dsp:nvSpPr>
-      <dsp:spPr>
-        <a:xfrm>
-          <a:off x="399615" y="242195"/>
-          <a:ext cx="2322676" cy="2322676"/>
-        </a:xfrm>
-        <a:prstGeom prst="pie">
-          <a:avLst>
-            <a:gd name="adj1" fmla="val 0"/>
-            <a:gd name="adj2" fmla="val 5400000"/>
-          </a:avLst>
-        </a:prstGeom>
-        <a:gradFill rotWithShape="0">
-          <a:gsLst>
-            <a:gs pos="0">
-              <a:schemeClr val="lt1">
-                <a:hueOff val="0"/>
-                <a:satOff val="0"/>
-                <a:lumOff val="0"/>
-                <a:alphaOff val="0"/>
-                <a:tint val="98000"/>
-                <a:lumMod val="114000"/>
-              </a:schemeClr>
-            </a:gs>
-            <a:gs pos="100000">
-              <a:schemeClr val="lt1">
-                <a:hueOff val="0"/>
-                <a:satOff val="0"/>
-                <a:lumOff val="0"/>
-                <a:alphaOff val="0"/>
-                <a:shade val="90000"/>
-                <a:lumMod val="84000"/>
-              </a:schemeClr>
-            </a:gs>
-          </a:gsLst>
-          <a:lin ang="5400000" scaled="0"/>
-        </a:gradFill>
-        <a:ln>
-          <a:noFill/>
-        </a:ln>
-        <a:effectLst>
-          <a:outerShdw blurRad="38100" dist="25400" dir="5400000" rotWithShape="0">
-            <a:srgbClr val="000000">
-              <a:alpha val="45000"/>
-            </a:srgbClr>
-          </a:outerShdw>
-        </a:effectLst>
-      </dsp:spPr>
-      <dsp:style>
-        <a:lnRef idx="0">
-          <a:scrgbClr r="0" g="0" b="0"/>
-        </a:lnRef>
-        <a:fillRef idx="3">
-          <a:scrgbClr r="0" g="0" b="0"/>
-        </a:fillRef>
-        <a:effectRef idx="2">
-          <a:scrgbClr r="0" g="0" b="0"/>
-        </a:effectRef>
-        <a:fontRef idx="minor">
-          <a:schemeClr val="lt1"/>
-        </a:fontRef>
-      </dsp:style>
-      <dsp:txBody>
-        <a:bodyPr spcFirstLastPara="0" vert="horz" wrap="square" lIns="21590" tIns="21590" rIns="21590" bIns="21590" numCol="1" spcCol="1270" anchor="ctr" anchorCtr="0">
-          <a:noAutofit/>
-        </a:bodyPr>
-        <a:lstStyle/>
-        <a:p>
-          <a:pPr lvl="0" algn="ctr" defTabSz="755650">
-            <a:lnSpc>
-              <a:spcPct val="90000"/>
-            </a:lnSpc>
-            <a:spcBef>
-              <a:spcPct val="0"/>
-            </a:spcBef>
-            <a:spcAft>
-              <a:spcPct val="35000"/>
-            </a:spcAft>
-          </a:pPr>
-          <a:r>
-            <a:rPr lang="en-US" sz="1700" kern="1200" dirty="0" smtClean="0"/>
-            <a:t>DEMO2</a:t>
-          </a:r>
-          <a:endParaRPr lang="en-US" sz="1700" kern="1200" dirty="0"/>
-        </a:p>
-      </dsp:txBody>
-      <dsp:txXfrm>
-        <a:off x="1632569" y="1447498"/>
-        <a:ext cx="857178" cy="635970"/>
-      </dsp:txXfrm>
-    </dsp:sp>
-    <dsp:sp modelId="{075A10BF-F58B-4399-B76F-5FBBFA542012}">
-      <dsp:nvSpPr>
-        <dsp:cNvPr id="0" name=""/>
-        <dsp:cNvSpPr/>
-      </dsp:nvSpPr>
-      <dsp:spPr>
-        <a:xfrm>
-          <a:off x="321639" y="242195"/>
-          <a:ext cx="2322676" cy="2322676"/>
-        </a:xfrm>
-        <a:prstGeom prst="pie">
-          <a:avLst>
-            <a:gd name="adj1" fmla="val 5400000"/>
-            <a:gd name="adj2" fmla="val 10800000"/>
-          </a:avLst>
-        </a:prstGeom>
-        <a:gradFill rotWithShape="0">
-          <a:gsLst>
-            <a:gs pos="0">
-              <a:schemeClr val="lt1">
-                <a:hueOff val="0"/>
-                <a:satOff val="0"/>
-                <a:lumOff val="0"/>
-                <a:alphaOff val="0"/>
-                <a:tint val="98000"/>
-                <a:lumMod val="114000"/>
-              </a:schemeClr>
-            </a:gs>
-            <a:gs pos="100000">
-              <a:schemeClr val="lt1">
-                <a:hueOff val="0"/>
-                <a:satOff val="0"/>
-                <a:lumOff val="0"/>
-                <a:alphaOff val="0"/>
-                <a:shade val="90000"/>
-                <a:lumMod val="84000"/>
-              </a:schemeClr>
-            </a:gs>
-          </a:gsLst>
-          <a:lin ang="5400000" scaled="0"/>
-        </a:gradFill>
-        <a:ln>
-          <a:noFill/>
-        </a:ln>
-        <a:effectLst>
-          <a:outerShdw blurRad="38100" dist="25400" dir="5400000" rotWithShape="0">
-            <a:srgbClr val="000000">
-              <a:alpha val="45000"/>
-            </a:srgbClr>
-          </a:outerShdw>
-        </a:effectLst>
-      </dsp:spPr>
-      <dsp:style>
-        <a:lnRef idx="0">
-          <a:scrgbClr r="0" g="0" b="0"/>
-        </a:lnRef>
-        <a:fillRef idx="3">
-          <a:scrgbClr r="0" g="0" b="0"/>
-        </a:fillRef>
-        <a:effectRef idx="2">
-          <a:scrgbClr r="0" g="0" b="0"/>
-        </a:effectRef>
-        <a:fontRef idx="minor">
-          <a:schemeClr val="lt1"/>
-        </a:fontRef>
-      </dsp:style>
-      <dsp:txBody>
-        <a:bodyPr spcFirstLastPara="0" vert="horz" wrap="square" lIns="21590" tIns="21590" rIns="21590" bIns="21590" numCol="1" spcCol="1270" anchor="ctr" anchorCtr="0">
-          <a:noAutofit/>
-        </a:bodyPr>
-        <a:lstStyle/>
-        <a:p>
-          <a:pPr lvl="0" algn="ctr" defTabSz="755650">
-            <a:lnSpc>
-              <a:spcPct val="90000"/>
-            </a:lnSpc>
-            <a:spcBef>
-              <a:spcPct val="0"/>
-            </a:spcBef>
-            <a:spcAft>
-              <a:spcPct val="35000"/>
-            </a:spcAft>
-          </a:pPr>
-          <a:endParaRPr lang="en-US" sz="1700" kern="1200" dirty="0"/>
-        </a:p>
-      </dsp:txBody>
-      <dsp:txXfrm>
-        <a:off x="554184" y="1447498"/>
-        <a:ext cx="857178" cy="635970"/>
-      </dsp:txXfrm>
-    </dsp:sp>
-    <dsp:sp modelId="{22B377EF-E448-456D-9679-6E3F43C2FBCA}">
-      <dsp:nvSpPr>
-        <dsp:cNvPr id="0" name=""/>
-        <dsp:cNvSpPr/>
-      </dsp:nvSpPr>
-      <dsp:spPr>
-        <a:xfrm>
-          <a:off x="321639" y="164219"/>
-          <a:ext cx="2322676" cy="2322676"/>
-        </a:xfrm>
-        <a:prstGeom prst="pie">
-          <a:avLst>
-            <a:gd name="adj1" fmla="val 10800000"/>
-            <a:gd name="adj2" fmla="val 16200000"/>
-          </a:avLst>
-        </a:prstGeom>
-        <a:gradFill rotWithShape="0">
-          <a:gsLst>
-            <a:gs pos="0">
-              <a:schemeClr val="lt1">
-                <a:hueOff val="0"/>
-                <a:satOff val="0"/>
-                <a:lumOff val="0"/>
-                <a:alphaOff val="0"/>
-                <a:tint val="98000"/>
-                <a:lumMod val="114000"/>
-              </a:schemeClr>
-            </a:gs>
-            <a:gs pos="100000">
-              <a:schemeClr val="lt1">
-                <a:hueOff val="0"/>
-                <a:satOff val="0"/>
-                <a:lumOff val="0"/>
-                <a:alphaOff val="0"/>
-                <a:shade val="90000"/>
-                <a:lumMod val="84000"/>
-              </a:schemeClr>
-            </a:gs>
-          </a:gsLst>
-          <a:lin ang="5400000" scaled="0"/>
-        </a:gradFill>
-        <a:ln>
-          <a:noFill/>
-        </a:ln>
-        <a:effectLst>
-          <a:outerShdw blurRad="38100" dist="25400" dir="5400000" rotWithShape="0">
-            <a:srgbClr val="000000">
-              <a:alpha val="45000"/>
-            </a:srgbClr>
-          </a:outerShdw>
-        </a:effectLst>
-      </dsp:spPr>
-      <dsp:style>
-        <a:lnRef idx="0">
-          <a:scrgbClr r="0" g="0" b="0"/>
-        </a:lnRef>
-        <a:fillRef idx="3">
-          <a:scrgbClr r="0" g="0" b="0"/>
-        </a:fillRef>
-        <a:effectRef idx="2">
-          <a:scrgbClr r="0" g="0" b="0"/>
-        </a:effectRef>
-        <a:fontRef idx="minor">
-          <a:schemeClr val="lt1"/>
-        </a:fontRef>
-      </dsp:style>
-      <dsp:txBody>
-        <a:bodyPr spcFirstLastPara="0" vert="horz" wrap="square" lIns="21590" tIns="21590" rIns="21590" bIns="21590" numCol="1" spcCol="1270" anchor="ctr" anchorCtr="0">
-          <a:noAutofit/>
-        </a:bodyPr>
-        <a:lstStyle/>
-        <a:p>
-          <a:pPr lvl="0" algn="ctr" defTabSz="755650">
-            <a:lnSpc>
-              <a:spcPct val="90000"/>
-            </a:lnSpc>
-            <a:spcBef>
-              <a:spcPct val="0"/>
-            </a:spcBef>
-            <a:spcAft>
-              <a:spcPct val="35000"/>
-            </a:spcAft>
-          </a:pPr>
-          <a:endParaRPr lang="en-US" sz="1700" kern="1200"/>
-        </a:p>
-      </dsp:txBody>
-      <dsp:txXfrm>
-        <a:off x="554184" y="645621"/>
-        <a:ext cx="857178" cy="635970"/>
-      </dsp:txXfrm>
-    </dsp:sp>
-    <dsp:sp modelId="{3B8823FF-7D26-41A5-8E9A-269A3D4A70E0}">
-      <dsp:nvSpPr>
-        <dsp:cNvPr id="0" name=""/>
-        <dsp:cNvSpPr/>
-      </dsp:nvSpPr>
-      <dsp:spPr>
-        <a:xfrm>
-          <a:off x="255830" y="20434"/>
-          <a:ext cx="2610245" cy="2610245"/>
-        </a:xfrm>
-        <a:prstGeom prst="circularArrow">
-          <a:avLst>
-            <a:gd name="adj1" fmla="val 5085"/>
-            <a:gd name="adj2" fmla="val 327528"/>
-            <a:gd name="adj3" fmla="val 21272472"/>
-            <a:gd name="adj4" fmla="val 16200000"/>
-            <a:gd name="adj5" fmla="val 5932"/>
-          </a:avLst>
-        </a:prstGeom>
-        <a:gradFill rotWithShape="0">
-          <a:gsLst>
-            <a:gs pos="0">
-              <a:schemeClr val="dk2">
-                <a:tint val="60000"/>
-                <a:hueOff val="0"/>
-                <a:satOff val="0"/>
-                <a:lumOff val="0"/>
-                <a:alphaOff val="0"/>
-                <a:tint val="98000"/>
-                <a:lumMod val="114000"/>
-              </a:schemeClr>
-            </a:gs>
-            <a:gs pos="100000">
-              <a:schemeClr val="dk2">
-                <a:tint val="60000"/>
-                <a:hueOff val="0"/>
-                <a:satOff val="0"/>
-                <a:lumOff val="0"/>
-                <a:alphaOff val="0"/>
-                <a:shade val="90000"/>
-                <a:lumMod val="84000"/>
-              </a:schemeClr>
-            </a:gs>
-          </a:gsLst>
-          <a:lin ang="5400000" scaled="0"/>
-        </a:gradFill>
-        <a:ln>
-          <a:noFill/>
-        </a:ln>
-        <a:effectLst>
-          <a:outerShdw blurRad="38100" dist="25400" dir="5400000" rotWithShape="0">
-            <a:srgbClr val="000000">
-              <a:alpha val="45000"/>
-            </a:srgbClr>
-          </a:outerShdw>
-        </a:effectLst>
-      </dsp:spPr>
-      <dsp:style>
-        <a:lnRef idx="0">
-          <a:scrgbClr r="0" g="0" b="0"/>
-        </a:lnRef>
-        <a:fillRef idx="3">
-          <a:scrgbClr r="0" g="0" b="0"/>
-        </a:fillRef>
-        <a:effectRef idx="2">
-          <a:scrgbClr r="0" g="0" b="0"/>
-        </a:effectRef>
-        <a:fontRef idx="minor">
-          <a:schemeClr val="lt1"/>
-        </a:fontRef>
-      </dsp:style>
-    </dsp:sp>
-    <dsp:sp modelId="{76255BB8-E339-40C0-AFA8-AD87F601C736}">
-      <dsp:nvSpPr>
-        <dsp:cNvPr id="0" name=""/>
-        <dsp:cNvSpPr/>
-      </dsp:nvSpPr>
-      <dsp:spPr>
-        <a:xfrm>
-          <a:off x="255830" y="98410"/>
-          <a:ext cx="2610245" cy="2610245"/>
-        </a:xfrm>
-        <a:prstGeom prst="circularArrow">
-          <a:avLst>
-            <a:gd name="adj1" fmla="val 5085"/>
-            <a:gd name="adj2" fmla="val 327528"/>
-            <a:gd name="adj3" fmla="val 5072472"/>
-            <a:gd name="adj4" fmla="val 0"/>
-            <a:gd name="adj5" fmla="val 5932"/>
-          </a:avLst>
-        </a:prstGeom>
-        <a:gradFill rotWithShape="0">
-          <a:gsLst>
-            <a:gs pos="0">
-              <a:schemeClr val="dk2">
-                <a:tint val="60000"/>
-                <a:hueOff val="0"/>
-                <a:satOff val="0"/>
-                <a:lumOff val="0"/>
-                <a:alphaOff val="0"/>
-                <a:tint val="98000"/>
-                <a:lumMod val="114000"/>
-              </a:schemeClr>
-            </a:gs>
-            <a:gs pos="100000">
-              <a:schemeClr val="dk2">
-                <a:tint val="60000"/>
-                <a:hueOff val="0"/>
-                <a:satOff val="0"/>
-                <a:lumOff val="0"/>
-                <a:alphaOff val="0"/>
-                <a:shade val="90000"/>
-                <a:lumMod val="84000"/>
-              </a:schemeClr>
-            </a:gs>
-          </a:gsLst>
-          <a:lin ang="5400000" scaled="0"/>
-        </a:gradFill>
-        <a:ln>
-          <a:noFill/>
-        </a:ln>
-        <a:effectLst>
-          <a:outerShdw blurRad="38100" dist="25400" dir="5400000" rotWithShape="0">
-            <a:srgbClr val="000000">
-              <a:alpha val="45000"/>
-            </a:srgbClr>
-          </a:outerShdw>
-        </a:effectLst>
-      </dsp:spPr>
-      <dsp:style>
-        <a:lnRef idx="0">
-          <a:scrgbClr r="0" g="0" b="0"/>
-        </a:lnRef>
-        <a:fillRef idx="3">
-          <a:scrgbClr r="0" g="0" b="0"/>
-        </a:fillRef>
-        <a:effectRef idx="2">
-          <a:scrgbClr r="0" g="0" b="0"/>
-        </a:effectRef>
-        <a:fontRef idx="minor">
-          <a:schemeClr val="lt1"/>
-        </a:fontRef>
-      </dsp:style>
-    </dsp:sp>
-    <dsp:sp modelId="{EC44A464-B054-45D6-9E76-5E5ADF360E05}">
-      <dsp:nvSpPr>
-        <dsp:cNvPr id="0" name=""/>
-        <dsp:cNvSpPr/>
-      </dsp:nvSpPr>
-      <dsp:spPr>
-        <a:xfrm>
-          <a:off x="177855" y="98410"/>
-          <a:ext cx="2610245" cy="2610245"/>
-        </a:xfrm>
-        <a:prstGeom prst="circularArrow">
-          <a:avLst>
-            <a:gd name="adj1" fmla="val 5085"/>
-            <a:gd name="adj2" fmla="val 327528"/>
-            <a:gd name="adj3" fmla="val 10472472"/>
-            <a:gd name="adj4" fmla="val 5400000"/>
-            <a:gd name="adj5" fmla="val 5932"/>
-          </a:avLst>
-        </a:prstGeom>
-        <a:gradFill rotWithShape="0">
-          <a:gsLst>
-            <a:gs pos="0">
-              <a:schemeClr val="dk2">
-                <a:tint val="60000"/>
-                <a:hueOff val="0"/>
-                <a:satOff val="0"/>
-                <a:lumOff val="0"/>
-                <a:alphaOff val="0"/>
-                <a:tint val="98000"/>
-                <a:lumMod val="114000"/>
-              </a:schemeClr>
-            </a:gs>
-            <a:gs pos="100000">
-              <a:schemeClr val="dk2">
-                <a:tint val="60000"/>
-                <a:hueOff val="0"/>
-                <a:satOff val="0"/>
-                <a:lumOff val="0"/>
-                <a:alphaOff val="0"/>
-                <a:shade val="90000"/>
-                <a:lumMod val="84000"/>
-              </a:schemeClr>
-            </a:gs>
-          </a:gsLst>
-          <a:lin ang="5400000" scaled="0"/>
-        </a:gradFill>
-        <a:ln>
-          <a:noFill/>
-        </a:ln>
-        <a:effectLst>
-          <a:outerShdw blurRad="38100" dist="25400" dir="5400000" rotWithShape="0">
-            <a:srgbClr val="000000">
-              <a:alpha val="45000"/>
-            </a:srgbClr>
-          </a:outerShdw>
-        </a:effectLst>
-      </dsp:spPr>
-      <dsp:style>
-        <a:lnRef idx="0">
-          <a:scrgbClr r="0" g="0" b="0"/>
-        </a:lnRef>
-        <a:fillRef idx="3">
-          <a:scrgbClr r="0" g="0" b="0"/>
-        </a:fillRef>
-        <a:effectRef idx="2">
-          <a:scrgbClr r="0" g="0" b="0"/>
-        </a:effectRef>
-        <a:fontRef idx="minor">
-          <a:schemeClr val="lt1"/>
-        </a:fontRef>
-      </dsp:style>
-    </dsp:sp>
-    <dsp:sp modelId="{E4DAE667-71E2-4F50-B78C-6055BEC443FB}">
-      <dsp:nvSpPr>
-        <dsp:cNvPr id="0" name=""/>
-        <dsp:cNvSpPr/>
-      </dsp:nvSpPr>
-      <dsp:spPr>
-        <a:xfrm>
-          <a:off x="177855" y="20434"/>
-          <a:ext cx="2610245" cy="2610245"/>
-        </a:xfrm>
-        <a:prstGeom prst="circularArrow">
-          <a:avLst>
-            <a:gd name="adj1" fmla="val 5085"/>
-            <a:gd name="adj2" fmla="val 327528"/>
-            <a:gd name="adj3" fmla="val 15872472"/>
-            <a:gd name="adj4" fmla="val 10800000"/>
-            <a:gd name="adj5" fmla="val 5932"/>
-          </a:avLst>
-        </a:prstGeom>
-        <a:gradFill rotWithShape="0">
-          <a:gsLst>
-            <a:gs pos="0">
-              <a:schemeClr val="dk2">
-                <a:tint val="60000"/>
-                <a:hueOff val="0"/>
-                <a:satOff val="0"/>
-                <a:lumOff val="0"/>
-                <a:alphaOff val="0"/>
-                <a:tint val="98000"/>
-                <a:lumMod val="114000"/>
-              </a:schemeClr>
-            </a:gs>
-            <a:gs pos="100000">
-              <a:schemeClr val="dk2">
-                <a:tint val="60000"/>
-                <a:hueOff val="0"/>
-                <a:satOff val="0"/>
-                <a:lumOff val="0"/>
-                <a:alphaOff val="0"/>
-                <a:shade val="90000"/>
-                <a:lumMod val="84000"/>
-              </a:schemeClr>
-            </a:gs>
-          </a:gsLst>
-          <a:lin ang="5400000" scaled="0"/>
-        </a:gradFill>
-        <a:ln>
-          <a:noFill/>
-        </a:ln>
-        <a:effectLst>
-          <a:outerShdw blurRad="38100" dist="25400" dir="5400000" rotWithShape="0">
-            <a:srgbClr val="000000">
-              <a:alpha val="45000"/>
-            </a:srgbClr>
-          </a:outerShdw>
-        </a:effectLst>
-      </dsp:spPr>
-      <dsp:style>
-        <a:lnRef idx="0">
-          <a:scrgbClr r="0" g="0" b="0"/>
-        </a:lnRef>
-        <a:fillRef idx="3">
-          <a:scrgbClr r="0" g="0" b="0"/>
-        </a:fillRef>
-        <a:effectRef idx="2">
-          <a:scrgbClr r="0" g="0" b="0"/>
-        </a:effectRef>
-        <a:fontRef idx="minor">
-          <a:schemeClr val="lt1"/>
-        </a:fontRef>
-      </dsp:style>
-    </dsp:sp>
   </dsp:spTree>
 </dsp:drawing>
 </file>
@@ -4895,662 +3672,6 @@
       <dsp:cNvGrpSpPr/>
     </dsp:nvGrpSpPr>
     <dsp:grpSpPr/>
-    <dsp:sp modelId="{5A2FB032-CC70-4B51-A7B3-CB0733FA716E}">
-      <dsp:nvSpPr>
-        <dsp:cNvPr id="0" name=""/>
-        <dsp:cNvSpPr/>
-      </dsp:nvSpPr>
-      <dsp:spPr>
-        <a:xfrm>
-          <a:off x="399615" y="164219"/>
-          <a:ext cx="2322676" cy="2322676"/>
-        </a:xfrm>
-        <a:prstGeom prst="pie">
-          <a:avLst>
-            <a:gd name="adj1" fmla="val 16200000"/>
-            <a:gd name="adj2" fmla="val 0"/>
-          </a:avLst>
-        </a:prstGeom>
-        <a:gradFill rotWithShape="0">
-          <a:gsLst>
-            <a:gs pos="0">
-              <a:schemeClr val="lt1">
-                <a:hueOff val="0"/>
-                <a:satOff val="0"/>
-                <a:lumOff val="0"/>
-                <a:alphaOff val="0"/>
-                <a:tint val="98000"/>
-                <a:lumMod val="114000"/>
-              </a:schemeClr>
-            </a:gs>
-            <a:gs pos="100000">
-              <a:schemeClr val="lt1">
-                <a:hueOff val="0"/>
-                <a:satOff val="0"/>
-                <a:lumOff val="0"/>
-                <a:alphaOff val="0"/>
-                <a:shade val="90000"/>
-                <a:lumMod val="84000"/>
-              </a:schemeClr>
-            </a:gs>
-          </a:gsLst>
-          <a:lin ang="5400000" scaled="0"/>
-        </a:gradFill>
-        <a:ln>
-          <a:noFill/>
-        </a:ln>
-        <a:effectLst>
-          <a:outerShdw blurRad="38100" dist="25400" dir="5400000" rotWithShape="0">
-            <a:srgbClr val="000000">
-              <a:alpha val="45000"/>
-            </a:srgbClr>
-          </a:outerShdw>
-        </a:effectLst>
-      </dsp:spPr>
-      <dsp:style>
-        <a:lnRef idx="0">
-          <a:scrgbClr r="0" g="0" b="0"/>
-        </a:lnRef>
-        <a:fillRef idx="3">
-          <a:scrgbClr r="0" g="0" b="0"/>
-        </a:fillRef>
-        <a:effectRef idx="2">
-          <a:scrgbClr r="0" g="0" b="0"/>
-        </a:effectRef>
-        <a:fontRef idx="minor">
-          <a:schemeClr val="lt1"/>
-        </a:fontRef>
-      </dsp:style>
-      <dsp:txBody>
-        <a:bodyPr spcFirstLastPara="0" vert="horz" wrap="square" lIns="21590" tIns="21590" rIns="21590" bIns="21590" numCol="1" spcCol="1270" anchor="ctr" anchorCtr="0">
-          <a:noAutofit/>
-        </a:bodyPr>
-        <a:lstStyle/>
-        <a:p>
-          <a:pPr lvl="0" algn="ctr" defTabSz="755650">
-            <a:lnSpc>
-              <a:spcPct val="90000"/>
-            </a:lnSpc>
-            <a:spcBef>
-              <a:spcPct val="0"/>
-            </a:spcBef>
-            <a:spcAft>
-              <a:spcPct val="35000"/>
-            </a:spcAft>
-          </a:pPr>
-          <a:endParaRPr lang="en-US" sz="1700" kern="1200" dirty="0"/>
-        </a:p>
-      </dsp:txBody>
-      <dsp:txXfrm>
-        <a:off x="1632569" y="645621"/>
-        <a:ext cx="857178" cy="635970"/>
-      </dsp:txXfrm>
-    </dsp:sp>
-    <dsp:sp modelId="{87EF04A0-496E-4674-BFA0-D541BE54BA23}">
-      <dsp:nvSpPr>
-        <dsp:cNvPr id="0" name=""/>
-        <dsp:cNvSpPr/>
-      </dsp:nvSpPr>
-      <dsp:spPr>
-        <a:xfrm>
-          <a:off x="399615" y="242195"/>
-          <a:ext cx="2322676" cy="2322676"/>
-        </a:xfrm>
-        <a:prstGeom prst="pie">
-          <a:avLst>
-            <a:gd name="adj1" fmla="val 0"/>
-            <a:gd name="adj2" fmla="val 5400000"/>
-          </a:avLst>
-        </a:prstGeom>
-        <a:gradFill rotWithShape="0">
-          <a:gsLst>
-            <a:gs pos="0">
-              <a:schemeClr val="lt1">
-                <a:hueOff val="0"/>
-                <a:satOff val="0"/>
-                <a:lumOff val="0"/>
-                <a:alphaOff val="0"/>
-                <a:tint val="98000"/>
-                <a:lumMod val="114000"/>
-              </a:schemeClr>
-            </a:gs>
-            <a:gs pos="100000">
-              <a:schemeClr val="lt1">
-                <a:hueOff val="0"/>
-                <a:satOff val="0"/>
-                <a:lumOff val="0"/>
-                <a:alphaOff val="0"/>
-                <a:shade val="90000"/>
-                <a:lumMod val="84000"/>
-              </a:schemeClr>
-            </a:gs>
-          </a:gsLst>
-          <a:lin ang="5400000" scaled="0"/>
-        </a:gradFill>
-        <a:ln>
-          <a:noFill/>
-        </a:ln>
-        <a:effectLst>
-          <a:outerShdw blurRad="38100" dist="25400" dir="5400000" rotWithShape="0">
-            <a:srgbClr val="000000">
-              <a:alpha val="45000"/>
-            </a:srgbClr>
-          </a:outerShdw>
-        </a:effectLst>
-      </dsp:spPr>
-      <dsp:style>
-        <a:lnRef idx="0">
-          <a:scrgbClr r="0" g="0" b="0"/>
-        </a:lnRef>
-        <a:fillRef idx="3">
-          <a:scrgbClr r="0" g="0" b="0"/>
-        </a:fillRef>
-        <a:effectRef idx="2">
-          <a:scrgbClr r="0" g="0" b="0"/>
-        </a:effectRef>
-        <a:fontRef idx="minor">
-          <a:schemeClr val="lt1"/>
-        </a:fontRef>
-      </dsp:style>
-      <dsp:txBody>
-        <a:bodyPr spcFirstLastPara="0" vert="horz" wrap="square" lIns="21590" tIns="21590" rIns="21590" bIns="21590" numCol="1" spcCol="1270" anchor="ctr" anchorCtr="0">
-          <a:noAutofit/>
-        </a:bodyPr>
-        <a:lstStyle/>
-        <a:p>
-          <a:pPr lvl="0" algn="ctr" defTabSz="755650">
-            <a:lnSpc>
-              <a:spcPct val="90000"/>
-            </a:lnSpc>
-            <a:spcBef>
-              <a:spcPct val="0"/>
-            </a:spcBef>
-            <a:spcAft>
-              <a:spcPct val="35000"/>
-            </a:spcAft>
-          </a:pPr>
-          <a:endParaRPr lang="en-US" sz="1700" kern="1200" dirty="0"/>
-        </a:p>
-      </dsp:txBody>
-      <dsp:txXfrm>
-        <a:off x="1632569" y="1447498"/>
-        <a:ext cx="857178" cy="635970"/>
-      </dsp:txXfrm>
-    </dsp:sp>
-    <dsp:sp modelId="{075A10BF-F58B-4399-B76F-5FBBFA542012}">
-      <dsp:nvSpPr>
-        <dsp:cNvPr id="0" name=""/>
-        <dsp:cNvSpPr/>
-      </dsp:nvSpPr>
-      <dsp:spPr>
-        <a:xfrm>
-          <a:off x="321639" y="242195"/>
-          <a:ext cx="2322676" cy="2322676"/>
-        </a:xfrm>
-        <a:prstGeom prst="pie">
-          <a:avLst>
-            <a:gd name="adj1" fmla="val 5400000"/>
-            <a:gd name="adj2" fmla="val 10800000"/>
-          </a:avLst>
-        </a:prstGeom>
-        <a:gradFill rotWithShape="0">
-          <a:gsLst>
-            <a:gs pos="0">
-              <a:schemeClr val="lt1">
-                <a:hueOff val="0"/>
-                <a:satOff val="0"/>
-                <a:lumOff val="0"/>
-                <a:alphaOff val="0"/>
-                <a:tint val="98000"/>
-                <a:lumMod val="114000"/>
-              </a:schemeClr>
-            </a:gs>
-            <a:gs pos="100000">
-              <a:schemeClr val="lt1">
-                <a:hueOff val="0"/>
-                <a:satOff val="0"/>
-                <a:lumOff val="0"/>
-                <a:alphaOff val="0"/>
-                <a:shade val="90000"/>
-                <a:lumMod val="84000"/>
-              </a:schemeClr>
-            </a:gs>
-          </a:gsLst>
-          <a:lin ang="5400000" scaled="0"/>
-        </a:gradFill>
-        <a:ln>
-          <a:noFill/>
-        </a:ln>
-        <a:effectLst>
-          <a:outerShdw blurRad="38100" dist="25400" dir="5400000" rotWithShape="0">
-            <a:srgbClr val="000000">
-              <a:alpha val="45000"/>
-            </a:srgbClr>
-          </a:outerShdw>
-        </a:effectLst>
-      </dsp:spPr>
-      <dsp:style>
-        <a:lnRef idx="0">
-          <a:scrgbClr r="0" g="0" b="0"/>
-        </a:lnRef>
-        <a:fillRef idx="3">
-          <a:scrgbClr r="0" g="0" b="0"/>
-        </a:fillRef>
-        <a:effectRef idx="2">
-          <a:scrgbClr r="0" g="0" b="0"/>
-        </a:effectRef>
-        <a:fontRef idx="minor">
-          <a:schemeClr val="lt1"/>
-        </a:fontRef>
-      </dsp:style>
-      <dsp:txBody>
-        <a:bodyPr spcFirstLastPara="0" vert="horz" wrap="square" lIns="21590" tIns="21590" rIns="21590" bIns="21590" numCol="1" spcCol="1270" anchor="ctr" anchorCtr="0">
-          <a:noAutofit/>
-        </a:bodyPr>
-        <a:lstStyle/>
-        <a:p>
-          <a:pPr lvl="0" algn="ctr" defTabSz="755650">
-            <a:lnSpc>
-              <a:spcPct val="90000"/>
-            </a:lnSpc>
-            <a:spcBef>
-              <a:spcPct val="0"/>
-            </a:spcBef>
-            <a:spcAft>
-              <a:spcPct val="35000"/>
-            </a:spcAft>
-          </a:pPr>
-          <a:r>
-            <a:rPr lang="en-US" sz="1700" kern="1200" dirty="0" smtClean="0"/>
-            <a:t>DEMO3</a:t>
-          </a:r>
-          <a:endParaRPr lang="en-US" sz="1700" kern="1200" dirty="0"/>
-        </a:p>
-      </dsp:txBody>
-      <dsp:txXfrm>
-        <a:off x="554184" y="1447498"/>
-        <a:ext cx="857178" cy="635970"/>
-      </dsp:txXfrm>
-    </dsp:sp>
-    <dsp:sp modelId="{22B377EF-E448-456D-9679-6E3F43C2FBCA}">
-      <dsp:nvSpPr>
-        <dsp:cNvPr id="0" name=""/>
-        <dsp:cNvSpPr/>
-      </dsp:nvSpPr>
-      <dsp:spPr>
-        <a:xfrm>
-          <a:off x="321639" y="164219"/>
-          <a:ext cx="2322676" cy="2322676"/>
-        </a:xfrm>
-        <a:prstGeom prst="pie">
-          <a:avLst>
-            <a:gd name="adj1" fmla="val 10800000"/>
-            <a:gd name="adj2" fmla="val 16200000"/>
-          </a:avLst>
-        </a:prstGeom>
-        <a:gradFill rotWithShape="0">
-          <a:gsLst>
-            <a:gs pos="0">
-              <a:schemeClr val="lt1">
-                <a:hueOff val="0"/>
-                <a:satOff val="0"/>
-                <a:lumOff val="0"/>
-                <a:alphaOff val="0"/>
-                <a:tint val="98000"/>
-                <a:lumMod val="114000"/>
-              </a:schemeClr>
-            </a:gs>
-            <a:gs pos="100000">
-              <a:schemeClr val="lt1">
-                <a:hueOff val="0"/>
-                <a:satOff val="0"/>
-                <a:lumOff val="0"/>
-                <a:alphaOff val="0"/>
-                <a:shade val="90000"/>
-                <a:lumMod val="84000"/>
-              </a:schemeClr>
-            </a:gs>
-          </a:gsLst>
-          <a:lin ang="5400000" scaled="0"/>
-        </a:gradFill>
-        <a:ln>
-          <a:noFill/>
-        </a:ln>
-        <a:effectLst>
-          <a:outerShdw blurRad="38100" dist="25400" dir="5400000" rotWithShape="0">
-            <a:srgbClr val="000000">
-              <a:alpha val="45000"/>
-            </a:srgbClr>
-          </a:outerShdw>
-        </a:effectLst>
-      </dsp:spPr>
-      <dsp:style>
-        <a:lnRef idx="0">
-          <a:scrgbClr r="0" g="0" b="0"/>
-        </a:lnRef>
-        <a:fillRef idx="3">
-          <a:scrgbClr r="0" g="0" b="0"/>
-        </a:fillRef>
-        <a:effectRef idx="2">
-          <a:scrgbClr r="0" g="0" b="0"/>
-        </a:effectRef>
-        <a:fontRef idx="minor">
-          <a:schemeClr val="lt1"/>
-        </a:fontRef>
-      </dsp:style>
-      <dsp:txBody>
-        <a:bodyPr spcFirstLastPara="0" vert="horz" wrap="square" lIns="21590" tIns="21590" rIns="21590" bIns="21590" numCol="1" spcCol="1270" anchor="ctr" anchorCtr="0">
-          <a:noAutofit/>
-        </a:bodyPr>
-        <a:lstStyle/>
-        <a:p>
-          <a:pPr lvl="0" algn="ctr" defTabSz="755650">
-            <a:lnSpc>
-              <a:spcPct val="90000"/>
-            </a:lnSpc>
-            <a:spcBef>
-              <a:spcPct val="0"/>
-            </a:spcBef>
-            <a:spcAft>
-              <a:spcPct val="35000"/>
-            </a:spcAft>
-          </a:pPr>
-          <a:endParaRPr lang="en-US" sz="1700" kern="1200"/>
-        </a:p>
-      </dsp:txBody>
-      <dsp:txXfrm>
-        <a:off x="554184" y="645621"/>
-        <a:ext cx="857178" cy="635970"/>
-      </dsp:txXfrm>
-    </dsp:sp>
-    <dsp:sp modelId="{3B8823FF-7D26-41A5-8E9A-269A3D4A70E0}">
-      <dsp:nvSpPr>
-        <dsp:cNvPr id="0" name=""/>
-        <dsp:cNvSpPr/>
-      </dsp:nvSpPr>
-      <dsp:spPr>
-        <a:xfrm>
-          <a:off x="255830" y="20434"/>
-          <a:ext cx="2610245" cy="2610245"/>
-        </a:xfrm>
-        <a:prstGeom prst="circularArrow">
-          <a:avLst>
-            <a:gd name="adj1" fmla="val 5085"/>
-            <a:gd name="adj2" fmla="val 327528"/>
-            <a:gd name="adj3" fmla="val 21272472"/>
-            <a:gd name="adj4" fmla="val 16200000"/>
-            <a:gd name="adj5" fmla="val 5932"/>
-          </a:avLst>
-        </a:prstGeom>
-        <a:gradFill rotWithShape="0">
-          <a:gsLst>
-            <a:gs pos="0">
-              <a:schemeClr val="dk2">
-                <a:tint val="60000"/>
-                <a:hueOff val="0"/>
-                <a:satOff val="0"/>
-                <a:lumOff val="0"/>
-                <a:alphaOff val="0"/>
-                <a:tint val="98000"/>
-                <a:lumMod val="114000"/>
-              </a:schemeClr>
-            </a:gs>
-            <a:gs pos="100000">
-              <a:schemeClr val="dk2">
-                <a:tint val="60000"/>
-                <a:hueOff val="0"/>
-                <a:satOff val="0"/>
-                <a:lumOff val="0"/>
-                <a:alphaOff val="0"/>
-                <a:shade val="90000"/>
-                <a:lumMod val="84000"/>
-              </a:schemeClr>
-            </a:gs>
-          </a:gsLst>
-          <a:lin ang="5400000" scaled="0"/>
-        </a:gradFill>
-        <a:ln>
-          <a:noFill/>
-        </a:ln>
-        <a:effectLst>
-          <a:outerShdw blurRad="38100" dist="25400" dir="5400000" rotWithShape="0">
-            <a:srgbClr val="000000">
-              <a:alpha val="45000"/>
-            </a:srgbClr>
-          </a:outerShdw>
-        </a:effectLst>
-      </dsp:spPr>
-      <dsp:style>
-        <a:lnRef idx="0">
-          <a:scrgbClr r="0" g="0" b="0"/>
-        </a:lnRef>
-        <a:fillRef idx="3">
-          <a:scrgbClr r="0" g="0" b="0"/>
-        </a:fillRef>
-        <a:effectRef idx="2">
-          <a:scrgbClr r="0" g="0" b="0"/>
-        </a:effectRef>
-        <a:fontRef idx="minor">
-          <a:schemeClr val="lt1"/>
-        </a:fontRef>
-      </dsp:style>
-    </dsp:sp>
-    <dsp:sp modelId="{92525709-E134-49DA-9F75-F20F7C36000B}">
-      <dsp:nvSpPr>
-        <dsp:cNvPr id="0" name=""/>
-        <dsp:cNvSpPr/>
-      </dsp:nvSpPr>
-      <dsp:spPr>
-        <a:xfrm>
-          <a:off x="255830" y="98410"/>
-          <a:ext cx="2610245" cy="2610245"/>
-        </a:xfrm>
-        <a:prstGeom prst="circularArrow">
-          <a:avLst>
-            <a:gd name="adj1" fmla="val 5085"/>
-            <a:gd name="adj2" fmla="val 327528"/>
-            <a:gd name="adj3" fmla="val 5072472"/>
-            <a:gd name="adj4" fmla="val 0"/>
-            <a:gd name="adj5" fmla="val 5932"/>
-          </a:avLst>
-        </a:prstGeom>
-        <a:gradFill rotWithShape="0">
-          <a:gsLst>
-            <a:gs pos="0">
-              <a:schemeClr val="dk2">
-                <a:tint val="60000"/>
-                <a:hueOff val="0"/>
-                <a:satOff val="0"/>
-                <a:lumOff val="0"/>
-                <a:alphaOff val="0"/>
-                <a:tint val="98000"/>
-                <a:lumMod val="114000"/>
-              </a:schemeClr>
-            </a:gs>
-            <a:gs pos="100000">
-              <a:schemeClr val="dk2">
-                <a:tint val="60000"/>
-                <a:hueOff val="0"/>
-                <a:satOff val="0"/>
-                <a:lumOff val="0"/>
-                <a:alphaOff val="0"/>
-                <a:shade val="90000"/>
-                <a:lumMod val="84000"/>
-              </a:schemeClr>
-            </a:gs>
-          </a:gsLst>
-          <a:lin ang="5400000" scaled="0"/>
-        </a:gradFill>
-        <a:ln>
-          <a:noFill/>
-        </a:ln>
-        <a:effectLst>
-          <a:outerShdw blurRad="38100" dist="25400" dir="5400000" rotWithShape="0">
-            <a:srgbClr val="000000">
-              <a:alpha val="45000"/>
-            </a:srgbClr>
-          </a:outerShdw>
-        </a:effectLst>
-      </dsp:spPr>
-      <dsp:style>
-        <a:lnRef idx="0">
-          <a:scrgbClr r="0" g="0" b="0"/>
-        </a:lnRef>
-        <a:fillRef idx="3">
-          <a:scrgbClr r="0" g="0" b="0"/>
-        </a:fillRef>
-        <a:effectRef idx="2">
-          <a:scrgbClr r="0" g="0" b="0"/>
-        </a:effectRef>
-        <a:fontRef idx="minor">
-          <a:schemeClr val="lt1"/>
-        </a:fontRef>
-      </dsp:style>
-    </dsp:sp>
-    <dsp:sp modelId="{EC44A464-B054-45D6-9E76-5E5ADF360E05}">
-      <dsp:nvSpPr>
-        <dsp:cNvPr id="0" name=""/>
-        <dsp:cNvSpPr/>
-      </dsp:nvSpPr>
-      <dsp:spPr>
-        <a:xfrm>
-          <a:off x="177855" y="98410"/>
-          <a:ext cx="2610245" cy="2610245"/>
-        </a:xfrm>
-        <a:prstGeom prst="circularArrow">
-          <a:avLst>
-            <a:gd name="adj1" fmla="val 5085"/>
-            <a:gd name="adj2" fmla="val 327528"/>
-            <a:gd name="adj3" fmla="val 10472472"/>
-            <a:gd name="adj4" fmla="val 5400000"/>
-            <a:gd name="adj5" fmla="val 5932"/>
-          </a:avLst>
-        </a:prstGeom>
-        <a:gradFill rotWithShape="0">
-          <a:gsLst>
-            <a:gs pos="0">
-              <a:schemeClr val="dk2">
-                <a:tint val="60000"/>
-                <a:hueOff val="0"/>
-                <a:satOff val="0"/>
-                <a:lumOff val="0"/>
-                <a:alphaOff val="0"/>
-                <a:tint val="98000"/>
-                <a:lumMod val="114000"/>
-              </a:schemeClr>
-            </a:gs>
-            <a:gs pos="100000">
-              <a:schemeClr val="dk2">
-                <a:tint val="60000"/>
-                <a:hueOff val="0"/>
-                <a:satOff val="0"/>
-                <a:lumOff val="0"/>
-                <a:alphaOff val="0"/>
-                <a:shade val="90000"/>
-                <a:lumMod val="84000"/>
-              </a:schemeClr>
-            </a:gs>
-          </a:gsLst>
-          <a:lin ang="5400000" scaled="0"/>
-        </a:gradFill>
-        <a:ln>
-          <a:noFill/>
-        </a:ln>
-        <a:effectLst>
-          <a:outerShdw blurRad="38100" dist="25400" dir="5400000" rotWithShape="0">
-            <a:srgbClr val="000000">
-              <a:alpha val="45000"/>
-            </a:srgbClr>
-          </a:outerShdw>
-        </a:effectLst>
-      </dsp:spPr>
-      <dsp:style>
-        <a:lnRef idx="0">
-          <a:scrgbClr r="0" g="0" b="0"/>
-        </a:lnRef>
-        <a:fillRef idx="3">
-          <a:scrgbClr r="0" g="0" b="0"/>
-        </a:fillRef>
-        <a:effectRef idx="2">
-          <a:scrgbClr r="0" g="0" b="0"/>
-        </a:effectRef>
-        <a:fontRef idx="minor">
-          <a:schemeClr val="lt1"/>
-        </a:fontRef>
-      </dsp:style>
-    </dsp:sp>
-    <dsp:sp modelId="{E4DAE667-71E2-4F50-B78C-6055BEC443FB}">
-      <dsp:nvSpPr>
-        <dsp:cNvPr id="0" name=""/>
-        <dsp:cNvSpPr/>
-      </dsp:nvSpPr>
-      <dsp:spPr>
-        <a:xfrm>
-          <a:off x="177855" y="20434"/>
-          <a:ext cx="2610245" cy="2610245"/>
-        </a:xfrm>
-        <a:prstGeom prst="circularArrow">
-          <a:avLst>
-            <a:gd name="adj1" fmla="val 5085"/>
-            <a:gd name="adj2" fmla="val 327528"/>
-            <a:gd name="adj3" fmla="val 15872472"/>
-            <a:gd name="adj4" fmla="val 10800000"/>
-            <a:gd name="adj5" fmla="val 5932"/>
-          </a:avLst>
-        </a:prstGeom>
-        <a:gradFill rotWithShape="0">
-          <a:gsLst>
-            <a:gs pos="0">
-              <a:schemeClr val="dk2">
-                <a:tint val="60000"/>
-                <a:hueOff val="0"/>
-                <a:satOff val="0"/>
-                <a:lumOff val="0"/>
-                <a:alphaOff val="0"/>
-                <a:tint val="98000"/>
-                <a:lumMod val="114000"/>
-              </a:schemeClr>
-            </a:gs>
-            <a:gs pos="100000">
-              <a:schemeClr val="dk2">
-                <a:tint val="60000"/>
-                <a:hueOff val="0"/>
-                <a:satOff val="0"/>
-                <a:lumOff val="0"/>
-                <a:alphaOff val="0"/>
-                <a:shade val="90000"/>
-                <a:lumMod val="84000"/>
-              </a:schemeClr>
-            </a:gs>
-          </a:gsLst>
-          <a:lin ang="5400000" scaled="0"/>
-        </a:gradFill>
-        <a:ln>
-          <a:noFill/>
-        </a:ln>
-        <a:effectLst>
-          <a:outerShdw blurRad="38100" dist="25400" dir="5400000" rotWithShape="0">
-            <a:srgbClr val="000000">
-              <a:alpha val="45000"/>
-            </a:srgbClr>
-          </a:outerShdw>
-        </a:effectLst>
-      </dsp:spPr>
-      <dsp:style>
-        <a:lnRef idx="0">
-          <a:scrgbClr r="0" g="0" b="0"/>
-        </a:lnRef>
-        <a:fillRef idx="3">
-          <a:scrgbClr r="0" g="0" b="0"/>
-        </a:fillRef>
-        <a:effectRef idx="2">
-          <a:scrgbClr r="0" g="0" b="0"/>
-        </a:effectRef>
-        <a:fontRef idx="minor">
-          <a:schemeClr val="lt1"/>
-        </a:fontRef>
-      </dsp:style>
-    </dsp:sp>
   </dsp:spTree>
 </dsp:drawing>
 </file>
@@ -14019,7 +12140,7 @@
           <a:p>
             <a:fld id="{32435A18-4997-4BA6-A467-CD0B1E5D126C}" type="datetimeFigureOut">
               <a:rPr lang="en-US" smtClean="0"/>
-              <a:t>3/20/2016</a:t>
+              <a:t>3/24/2016</a:t>
             </a:fld>
             <a:endParaRPr lang="en-US"/>
           </a:p>
@@ -14727,7 +12848,7 @@
             <a:fld id="{1E700B27-DE4C-4B9E-BB11-B9027034A00F}" type="datetimeFigureOut">
               <a:rPr lang="en-US" smtClean="0"/>
               <a:pPr/>
-              <a:t>3/20/2016</a:t>
+              <a:t>3/24/2016</a:t>
             </a:fld>
             <a:endParaRPr lang="en-US" dirty="0"/>
           </a:p>
@@ -15821,7 +13942,7 @@
           <a:p>
             <a:fld id="{C40F4739-9812-4A9F-890D-2AD6BA5F6EE8}" type="datetimeFigureOut">
               <a:rPr lang="en-US" smtClean="0"/>
-              <a:t>3/20/2016</a:t>
+              <a:t>3/24/2016</a:t>
             </a:fld>
             <a:endParaRPr lang="en-US" dirty="0"/>
           </a:p>
@@ -16807,7 +14928,7 @@
           <a:p>
             <a:fld id="{18845AC5-A3F8-44AA-BA8F-596CDCC976D3}" type="datetimeFigureOut">
               <a:rPr lang="en-US" smtClean="0"/>
-              <a:t>3/20/2016</a:t>
+              <a:t>3/24/2016</a:t>
             </a:fld>
             <a:endParaRPr lang="en-US" dirty="0"/>
           </a:p>
@@ -17947,7 +16068,7 @@
           <a:p>
             <a:fld id="{C873B183-A821-4095-A363-9EC968635539}" type="datetimeFigureOut">
               <a:rPr lang="en-US" smtClean="0"/>
-              <a:t>3/20/2016</a:t>
+              <a:t>3/24/2016</a:t>
             </a:fld>
             <a:endParaRPr lang="en-US" dirty="0"/>
           </a:p>
@@ -18986,7 +17107,7 @@
           <a:p>
             <a:fld id="{174D01B4-0AA5-45E6-B2E6-5FA4078AEBCF}" type="datetimeFigureOut">
               <a:rPr lang="en-US" smtClean="0"/>
-              <a:t>3/20/2016</a:t>
+              <a:t>3/24/2016</a:t>
             </a:fld>
             <a:endParaRPr lang="en-US" dirty="0"/>
           </a:p>
@@ -19652,7 +17773,7 @@
           <a:p>
             <a:fld id="{4147335C-0450-40D7-8612-B3203BED4F28}" type="datetimeFigureOut">
               <a:rPr lang="en-US" smtClean="0"/>
-              <a:t>3/20/2016</a:t>
+              <a:t>3/24/2016</a:t>
             </a:fld>
             <a:endParaRPr lang="en-US" dirty="0"/>
           </a:p>
@@ -20519,7 +18640,7 @@
           <a:p>
             <a:fld id="{D246A105-2A1C-4284-B4EA-07CF89B1A393}" type="datetimeFigureOut">
               <a:rPr lang="en-US" smtClean="0"/>
-              <a:t>3/20/2016</a:t>
+              <a:t>3/24/2016</a:t>
             </a:fld>
             <a:endParaRPr lang="en-US" dirty="0"/>
           </a:p>
@@ -20715,7 +18836,7 @@
           <a:p>
             <a:fld id="{80DBE609-F3F2-45E6-BD6A-E03A8C86C1AE}" type="datetimeFigureOut">
               <a:rPr lang="en-US" smtClean="0"/>
-              <a:t>3/20/2016</a:t>
+              <a:t>3/24/2016</a:t>
             </a:fld>
             <a:endParaRPr lang="en-US" dirty="0"/>
           </a:p>
@@ -21693,7 +19814,7 @@
           <a:p>
             <a:fld id="{7A24AD68-089C-4467-A8F3-EA2BBCA6B44E}" type="datetimeFigureOut">
               <a:rPr lang="en-US" smtClean="0"/>
-              <a:t>3/20/2016</a:t>
+              <a:t>3/24/2016</a:t>
             </a:fld>
             <a:endParaRPr lang="en-US" dirty="0"/>
           </a:p>
@@ -21910,7 +20031,7 @@
           <a:p>
             <a:fld id="{75C51FCE-E4BB-4680-8E50-3C0E348D2609}" type="datetimeFigureOut">
               <a:rPr lang="en-US" smtClean="0"/>
-              <a:t>3/20/2016</a:t>
+              <a:t>3/24/2016</a:t>
             </a:fld>
             <a:endParaRPr lang="en-US" dirty="0"/>
           </a:p>
@@ -22950,7 +21071,7 @@
           <a:p>
             <a:fld id="{8AAA073D-A903-47F8-8D16-77642FB0DF1F}" type="datetimeFigureOut">
               <a:rPr lang="en-US" smtClean="0"/>
-              <a:t>3/20/2016</a:t>
+              <a:t>3/24/2016</a:t>
             </a:fld>
             <a:endParaRPr lang="en-US" dirty="0"/>
           </a:p>
@@ -23228,7 +21349,7 @@
           <a:p>
             <a:fld id="{AB91FA40-626B-4CA1-85D0-7A9016E395BA}" type="datetimeFigureOut">
               <a:rPr lang="en-US" smtClean="0"/>
-              <a:t>3/20/2016</a:t>
+              <a:t>3/24/2016</a:t>
             </a:fld>
             <a:endParaRPr lang="en-US" dirty="0"/>
           </a:p>
@@ -23644,7 +21765,7 @@
           <a:p>
             <a:fld id="{C3F425EA-B9DC-48A7-991E-9A82573B1B21}" type="datetimeFigureOut">
               <a:rPr lang="en-US" smtClean="0"/>
-              <a:t>3/20/2016</a:t>
+              <a:t>3/24/2016</a:t>
             </a:fld>
             <a:endParaRPr lang="en-US" dirty="0"/>
           </a:p>
@@ -23777,7 +21898,7 @@
           <a:p>
             <a:fld id="{66CB97F8-6CEB-469B-AFCC-889F2A2B1D5A}" type="datetimeFigureOut">
               <a:rPr lang="en-US" smtClean="0"/>
-              <a:t>3/20/2016</a:t>
+              <a:t>3/24/2016</a:t>
             </a:fld>
             <a:endParaRPr lang="en-US" dirty="0"/>
           </a:p>
@@ -23878,7 +21999,7 @@
           <a:p>
             <a:fld id="{8FA9179F-009E-4FA5-B091-7EBB82A185BD}" type="datetimeFigureOut">
               <a:rPr lang="en-US" smtClean="0"/>
-              <a:t>3/20/2016</a:t>
+              <a:t>3/24/2016</a:t>
             </a:fld>
             <a:endParaRPr lang="en-US" dirty="0"/>
           </a:p>
@@ -24965,7 +23086,7 @@
           <a:p>
             <a:fld id="{8E665CEB-0076-4E37-B880-BCEA9784DE0A}" type="datetimeFigureOut">
               <a:rPr lang="en-US" smtClean="0"/>
-              <a:t>3/20/2016</a:t>
+              <a:t>3/24/2016</a:t>
             </a:fld>
             <a:endParaRPr lang="en-US" dirty="0"/>
           </a:p>
@@ -26079,7 +24200,7 @@
           <a:p>
             <a:fld id="{A6149E5E-3896-4118-99A7-7B85668F1C5E}" type="datetimeFigureOut">
               <a:rPr lang="en-US" smtClean="0"/>
-              <a:t>3/20/2016</a:t>
+              <a:t>3/24/2016</a:t>
             </a:fld>
             <a:endParaRPr lang="en-US" dirty="0"/>
           </a:p>
@@ -27082,7 +25203,7 @@
           <a:p>
             <a:fld id="{7E0D914D-B099-4142-A885-11F276715148}" type="datetimeFigureOut">
               <a:rPr lang="en-US" smtClean="0"/>
-              <a:t>3/20/2016</a:t>
+              <a:t>3/24/2016</a:t>
             </a:fld>
             <a:endParaRPr lang="en-US" dirty="0"/>
           </a:p>
@@ -29677,6 +27798,87 @@
               </a:rPr>
               <a:t>rtm</a:t>
             </a:r>
+            <a:endParaRPr lang="en-US" sz="1600" dirty="0" smtClean="0"/>
+          </a:p>
+          <a:p>
+            <a:r>
+              <a:rPr lang="en-US" sz="1600" dirty="0" smtClean="0"/>
+              <a:t>Autobahn open source </a:t>
+            </a:r>
+            <a:r>
+              <a:rPr lang="en-US" sz="1600" dirty="0" err="1" smtClean="0"/>
+              <a:t>WebSocket</a:t>
+            </a:r>
+            <a:r>
+              <a:rPr lang="en-US" sz="1600" dirty="0" smtClean="0"/>
+              <a:t> reference implementations and test suite </a:t>
+            </a:r>
+            <a:br>
+              <a:rPr lang="en-US" sz="1600" dirty="0" smtClean="0"/>
+            </a:br>
+            <a:r>
+              <a:rPr lang="en-US" sz="1600" dirty="0" smtClean="0"/>
+              <a:t>note: </a:t>
+            </a:r>
+            <a:r>
+              <a:rPr lang="en-US" sz="1600" dirty="0" err="1" smtClean="0"/>
+              <a:t>WebSockets</a:t>
+            </a:r>
+            <a:r>
+              <a:rPr lang="en-US" sz="1600" dirty="0" smtClean="0"/>
+              <a:t> </a:t>
+            </a:r>
+            <a:r>
+              <a:rPr lang="en-US" sz="1600" b="1" dirty="0" smtClean="0"/>
+              <a:t>and </a:t>
+            </a:r>
+            <a:r>
+              <a:rPr lang="en-US" sz="1600" dirty="0" smtClean="0">
+                <a:hlinkClick r:id="rId6"/>
+              </a:rPr>
+              <a:t>WAMP</a:t>
+            </a:r>
+            <a:r>
+              <a:rPr lang="en-US" sz="1600" dirty="0" smtClean="0"/>
+              <a:t> (</a:t>
+            </a:r>
+            <a:r>
+              <a:rPr lang="en-US" sz="1600" smtClean="0"/>
+              <a:t>PubSub </a:t>
+            </a:r>
+            <a:r>
+              <a:rPr lang="en-US" sz="1600" dirty="0" smtClean="0"/>
+              <a:t>+ RPC) </a:t>
+            </a:r>
+            <a:r>
+              <a:rPr lang="en-US" sz="1600" dirty="0" smtClean="0">
+                <a:hlinkClick r:id="rId7" action="ppaction://hlinkfile"/>
+              </a:rPr>
+              <a:t>autobahn.ws</a:t>
+            </a:r>
+            <a:r>
+              <a:rPr lang="en-US" sz="1600" dirty="0" smtClean="0"/>
+              <a:t/>
+            </a:r>
+            <a:br>
+              <a:rPr lang="en-US" sz="1600" dirty="0" smtClean="0"/>
+            </a:br>
+            <a:r>
+              <a:rPr lang="en-US" sz="1600" dirty="0" smtClean="0"/>
+              <a:t>also interesting is their </a:t>
+            </a:r>
+            <a:r>
+              <a:rPr lang="en-US" sz="1600" dirty="0" smtClean="0">
+                <a:hlinkClick r:id="rId8"/>
+              </a:rPr>
+              <a:t>client test report</a:t>
+            </a:r>
+            <a:r>
+              <a:rPr lang="en-US" sz="1600" dirty="0" smtClean="0"/>
+              <a:t> </a:t>
+            </a:r>
+          </a:p>
+          <a:p>
             <a:endParaRPr lang="en-US" sz="1600" dirty="0"/>
           </a:p>
         </p:txBody>

</xml_diff>